<commit_message>
Added in-class exercises for unit 01
</commit_message>
<xml_diff>
--- a/lectures/Lect01_IntroML.pptx
+++ b/lectures/Lect01_IntroML.pptx
@@ -5,7 +5,7 @@
     <p:sldMasterId id="2147483648" r:id="rId1"/>
   </p:sldMasterIdLst>
   <p:notesMasterIdLst>
-    <p:notesMasterId r:id="rId25"/>
+    <p:notesMasterId r:id="rId28"/>
   </p:notesMasterIdLst>
   <p:sldIdLst>
     <p:sldId id="258" r:id="rId2"/>
@@ -22,15 +22,18 @@
     <p:sldId id="265" r:id="rId13"/>
     <p:sldId id="266" r:id="rId14"/>
     <p:sldId id="267" r:id="rId15"/>
-    <p:sldId id="278" r:id="rId16"/>
-    <p:sldId id="268" r:id="rId17"/>
-    <p:sldId id="269" r:id="rId18"/>
-    <p:sldId id="270" r:id="rId19"/>
+    <p:sldId id="288" r:id="rId16"/>
+    <p:sldId id="278" r:id="rId17"/>
+    <p:sldId id="268" r:id="rId18"/>
+    <p:sldId id="269" r:id="rId19"/>
     <p:sldId id="272" r:id="rId20"/>
-    <p:sldId id="279" r:id="rId21"/>
-    <p:sldId id="277" r:id="rId22"/>
-    <p:sldId id="280" r:id="rId23"/>
-    <p:sldId id="276" r:id="rId24"/>
+    <p:sldId id="286" r:id="rId21"/>
+    <p:sldId id="285" r:id="rId22"/>
+    <p:sldId id="287" r:id="rId23"/>
+    <p:sldId id="279" r:id="rId24"/>
+    <p:sldId id="277" r:id="rId25"/>
+    <p:sldId id="280" r:id="rId26"/>
+    <p:sldId id="276" r:id="rId27"/>
   </p:sldIdLst>
   <p:sldSz cx="12192000" cy="6858000"/>
   <p:notesSz cx="7315200" cy="9601200"/>
@@ -230,7 +233,7 @@
           <a:p>
             <a:fld id="{B7D6DDD3-D7E9-488B-B626-1E8285E424D8}" type="datetimeFigureOut">
               <a:rPr lang="en-US" smtClean="0"/>
-              <a:t>8/19/2020</a:t>
+              <a:t>8/21/2020</a:t>
             </a:fld>
             <a:endParaRPr lang="en-US"/>
           </a:p>
@@ -5154,8 +5157,8 @@
           </a:p>
         </p:txBody>
       </p:sp>
-      <mc:AlternateContent xmlns:mc="http://schemas.openxmlformats.org/markup-compatibility/2006">
-        <mc:Choice xmlns:a14="http://schemas.microsoft.com/office/drawing/2010/main" Requires="a14">
+      <mc:AlternateContent xmlns:mc="http://schemas.openxmlformats.org/markup-compatibility/2006" xmlns:a14="http://schemas.microsoft.com/office/drawing/2010/main">
+        <mc:Choice Requires="a14">
           <p:sp>
             <p:nvSpPr>
               <p:cNvPr id="3" name="Content Placeholder 2"/>
@@ -5340,7 +5343,7 @@
             </p:txBody>
           </p:sp>
         </mc:Choice>
-        <mc:Fallback>
+        <mc:Fallback xmlns="">
           <p:sp>
             <p:nvSpPr>
               <p:cNvPr id="3" name="Content Placeholder 2"/>
@@ -6139,6 +6142,123 @@
       </p:grpSpPr>
       <p:sp>
         <p:nvSpPr>
+          <p:cNvPr id="2" name="Title 1">
+            <a:extLst>
+              <a:ext uri="{FF2B5EF4-FFF2-40B4-BE49-F238E27FC236}">
+                <a16:creationId xmlns:a16="http://schemas.microsoft.com/office/drawing/2014/main" id="{75E318EE-A910-4BE2-98F2-597F82AC202E}"/>
+              </a:ext>
+            </a:extLst>
+          </p:cNvPr>
+          <p:cNvSpPr>
+            <a:spLocks noGrp="1"/>
+          </p:cNvSpPr>
+          <p:nvPr>
+            <p:ph type="title"/>
+          </p:nvPr>
+        </p:nvSpPr>
+        <p:spPr/>
+        <p:txBody>
+          <a:bodyPr/>
+          <a:lstStyle/>
+          <a:p>
+            <a:r>
+              <a:rPr lang="en-US" dirty="0"/>
+              <a:t>In-Class Exercise 1</a:t>
+            </a:r>
+          </a:p>
+        </p:txBody>
+      </p:sp>
+      <p:sp>
+        <p:nvSpPr>
+          <p:cNvPr id="4" name="Slide Number Placeholder 3">
+            <a:extLst>
+              <a:ext uri="{FF2B5EF4-FFF2-40B4-BE49-F238E27FC236}">
+                <a16:creationId xmlns:a16="http://schemas.microsoft.com/office/drawing/2014/main" id="{B1304811-D26B-4F9D-8E04-13961A5470BC}"/>
+              </a:ext>
+            </a:extLst>
+          </p:cNvPr>
+          <p:cNvSpPr>
+            <a:spLocks noGrp="1"/>
+          </p:cNvSpPr>
+          <p:nvPr>
+            <p:ph type="sldNum" sz="quarter" idx="12"/>
+          </p:nvPr>
+        </p:nvSpPr>
+        <p:spPr/>
+        <p:txBody>
+          <a:bodyPr/>
+          <a:lstStyle/>
+          <a:p>
+            <a:fld id="{629637A9-119A-49DA-BD12-AAC58B377D80}" type="slidenum">
+              <a:rPr lang="en-US" smtClean="0"/>
+              <a:t>15</a:t>
+            </a:fld>
+            <a:endParaRPr lang="en-US" dirty="0"/>
+          </a:p>
+        </p:txBody>
+      </p:sp>
+      <p:pic>
+        <p:nvPicPr>
+          <p:cNvPr id="5" name="Picture 4">
+            <a:extLst>
+              <a:ext uri="{FF2B5EF4-FFF2-40B4-BE49-F238E27FC236}">
+                <a16:creationId xmlns:a16="http://schemas.microsoft.com/office/drawing/2014/main" id="{F94441F8-2348-4EF3-891C-88BF42B24BF1}"/>
+              </a:ext>
+            </a:extLst>
+          </p:cNvPr>
+          <p:cNvPicPr>
+            <a:picLocks noChangeAspect="1"/>
+          </p:cNvPicPr>
+          <p:nvPr/>
+        </p:nvPicPr>
+        <p:blipFill>
+          <a:blip r:embed="rId2"/>
+          <a:stretch>
+            <a:fillRect/>
+          </a:stretch>
+        </p:blipFill>
+        <p:spPr>
+          <a:xfrm>
+            <a:off x="1097280" y="1528811"/>
+            <a:ext cx="8407831" cy="3938337"/>
+          </a:xfrm>
+          <a:prstGeom prst="rect">
+            <a:avLst/>
+          </a:prstGeom>
+        </p:spPr>
+      </p:pic>
+    </p:spTree>
+    <p:extLst>
+      <p:ext uri="{BB962C8B-B14F-4D97-AF65-F5344CB8AC3E}">
+        <p14:creationId xmlns:p14="http://schemas.microsoft.com/office/powerpoint/2010/main" val="23006259"/>
+      </p:ext>
+    </p:extLst>
+  </p:cSld>
+  <p:clrMapOvr>
+    <a:masterClrMapping/>
+  </p:clrMapOvr>
+</p:sld>
+</file>
+
+<file path=ppt/slides/slide16.xml><?xml version="1.0" encoding="utf-8"?>
+<p:sld xmlns:a="http://schemas.openxmlformats.org/drawingml/2006/main" xmlns:r="http://schemas.openxmlformats.org/officeDocument/2006/relationships" xmlns:p="http://schemas.openxmlformats.org/presentationml/2006/main">
+  <p:cSld>
+    <p:spTree>
+      <p:nvGrpSpPr>
+        <p:cNvPr id="1" name=""/>
+        <p:cNvGrpSpPr/>
+        <p:nvPr/>
+      </p:nvGrpSpPr>
+      <p:grpSpPr>
+        <a:xfrm>
+          <a:off x="0" y="0"/>
+          <a:ext cx="0" cy="0"/>
+          <a:chOff x="0" y="0"/>
+          <a:chExt cx="0" cy="0"/>
+        </a:xfrm>
+      </p:grpSpPr>
+      <p:sp>
+        <p:nvSpPr>
           <p:cNvPr id="2" name="Title 1"/>
           <p:cNvSpPr>
             <a:spLocks noGrp="1"/>
@@ -6207,6 +6327,13 @@
             </a:r>
           </a:p>
           <a:p>
+            <a:pPr lvl="1"/>
+            <a:r>
+              <a:rPr lang="en-US" dirty="0"/>
+              <a:t>Reinforcement learning</a:t>
+            </a:r>
+          </a:p>
+          <a:p>
             <a:r>
               <a:rPr lang="en-US" dirty="0"/>
               <a:t>Why the hype today?</a:t>
@@ -6267,7 +6394,7 @@
           <a:p>
             <a:fld id="{629637A9-119A-49DA-BD12-AAC58B377D80}" type="slidenum">
               <a:rPr lang="en-US" smtClean="0"/>
-              <a:t>15</a:t>
+              <a:t>16</a:t>
             </a:fld>
             <a:endParaRPr lang="en-US" dirty="0"/>
           </a:p>
@@ -6332,7 +6459,7 @@
 </p:sld>
 </file>
 
-<file path=ppt/slides/slide16.xml><?xml version="1.0" encoding="utf-8"?>
+<file path=ppt/slides/slide17.xml><?xml version="1.0" encoding="utf-8"?>
 <p:sld xmlns:a="http://schemas.openxmlformats.org/drawingml/2006/main" xmlns:r="http://schemas.openxmlformats.org/officeDocument/2006/relationships" xmlns:p="http://schemas.openxmlformats.org/presentationml/2006/main">
   <p:cSld>
     <p:spTree>
@@ -6371,8 +6498,8 @@
           </a:p>
         </p:txBody>
       </p:sp>
-      <mc:AlternateContent xmlns:mc="http://schemas.openxmlformats.org/markup-compatibility/2006" xmlns:a14="http://schemas.microsoft.com/office/drawing/2010/main">
-        <mc:Choice Requires="a14">
+      <mc:AlternateContent xmlns:mc="http://schemas.openxmlformats.org/markup-compatibility/2006">
+        <mc:Choice xmlns:a14="http://schemas.microsoft.com/office/drawing/2010/main" Requires="a14">
           <p:sp>
             <p:nvSpPr>
               <p:cNvPr id="3" name="Content Placeholder 2"/>
@@ -6390,25 +6517,11 @@
               </a:xfrm>
             </p:spPr>
             <p:txBody>
-              <a:bodyPr/>
+              <a:bodyPr>
+                <a:normAutofit lnSpcReduction="10000"/>
+              </a:bodyPr>
               <a:lstStyle/>
               <a:p>
-                <a:r>
-                  <a:rPr lang="en-US" dirty="0"/>
-                  <a:t>Example:  Credit score</a:t>
-                </a:r>
-              </a:p>
-              <a:p>
-                <a:r>
-                  <a:rPr lang="en-US" dirty="0"/>
-                  <a:t>Determine if customer is high-risk or low-risk</a:t>
-                </a:r>
-              </a:p>
-              <a:p>
-                <a:r>
-                  <a:rPr lang="en-US" dirty="0"/>
-                  <a:t>Select some </a:t>
-                </a:r>
                 <a:r>
                   <a:rPr lang="en-US" dirty="0">
                     <a:solidFill>
@@ -6418,7 +6531,52 @@
                       </a:schemeClr>
                     </a:solidFill>
                   </a:rPr>
-                  <a:t>features</a:t>
+                  <a:t>Supervised learning</a:t>
+                </a:r>
+              </a:p>
+              <a:p>
+                <a:pPr lvl="1"/>
+                <a:r>
+                  <a:rPr lang="en-US" dirty="0"/>
+                  <a:t>Learn mapping from features </a:t>
+                </a:r>
+                <a14:m>
+                  <m:oMath xmlns:m="http://schemas.openxmlformats.org/officeDocument/2006/math">
+                    <m:r>
+                      <a:rPr lang="en-US" b="1" i="1" smtClean="0">
+                        <a:latin typeface="Cambria Math" panose="02040503050406030204" pitchFamily="18" charset="0"/>
+                      </a:rPr>
+                      <m:t>𝒙</m:t>
+                    </m:r>
+                  </m:oMath>
+                </a14:m>
+                <a:r>
+                  <a:rPr lang="en-US" dirty="0"/>
+                  <a:t> to target </a:t>
+                </a:r>
+                <a14:m>
+                  <m:oMath xmlns:m="http://schemas.openxmlformats.org/officeDocument/2006/math">
+                    <m:r>
+                      <a:rPr lang="en-US" i="1" smtClean="0">
+                        <a:latin typeface="Cambria Math" panose="02040503050406030204" pitchFamily="18" charset="0"/>
+                      </a:rPr>
+                      <m:t>𝑦</m:t>
+                    </m:r>
+                  </m:oMath>
+                </a14:m>
+                <a:endParaRPr lang="en-US" dirty="0"/>
+              </a:p>
+              <a:p>
+                <a:r>
+                  <a:rPr lang="en-US" dirty="0">
+                    <a:solidFill>
+                      <a:schemeClr val="accent1">
+                        <a:lumMod val="60000"/>
+                        <a:lumOff val="40000"/>
+                      </a:schemeClr>
+                    </a:solidFill>
+                  </a:rPr>
+                  <a:t>Classification</a:t>
                 </a:r>
                 <a:r>
                   <a:rPr lang="en-US" dirty="0"/>
@@ -6429,14 +6587,14 @@
                 <a:pPr lvl="1"/>
                 <a:r>
                   <a:rPr lang="en-US" dirty="0"/>
-                  <a:t>Example:  income &amp; savings</a:t>
+                  <a:t>Target is discrete.  One of a finite number of values</a:t>
                 </a:r>
               </a:p>
               <a:p>
                 <a:pPr lvl="1"/>
                 <a:r>
-                  <a:rPr lang="en-US" dirty="0"/>
-                  <a:t>Represent as a vector </a:t>
+                  <a:rPr lang="en-US" b="0" dirty="0"/>
+                  <a:t>Ex:  Binary </a:t>
                 </a:r>
                 <a14:m>
                   <m:oMath xmlns:m="http://schemas.openxmlformats.org/officeDocument/2006/math">
@@ -6444,7 +6602,77 @@
                       <a:rPr lang="en-US" b="0" i="1" smtClean="0">
                         <a:latin typeface="Cambria Math" panose="02040503050406030204" pitchFamily="18" charset="0"/>
                       </a:rPr>
-                      <m:t>𝑥</m:t>
+                      <m:t>𝑦</m:t>
+                    </m:r>
+                    <m:r>
+                      <a:rPr lang="en-US" b="0" i="1" smtClean="0">
+                        <a:latin typeface="Cambria Math" panose="02040503050406030204" pitchFamily="18" charset="0"/>
+                      </a:rPr>
+                      <m:t>∈</m:t>
+                    </m:r>
+                    <m:d>
+                      <m:dPr>
+                        <m:begChr m:val="{"/>
+                        <m:endChr m:val="}"/>
+                        <m:ctrlPr>
+                          <a:rPr lang="en-US" b="0" i="1" smtClean="0">
+                            <a:latin typeface="Cambria Math" panose="02040503050406030204" pitchFamily="18" charset="0"/>
+                          </a:rPr>
+                        </m:ctrlPr>
+                      </m:dPr>
+                      <m:e>
+                        <m:r>
+                          <a:rPr lang="en-US" b="0" i="1" smtClean="0">
+                            <a:latin typeface="Cambria Math" panose="02040503050406030204" pitchFamily="18" charset="0"/>
+                          </a:rPr>
+                          <m:t>0,1</m:t>
+                        </m:r>
+                      </m:e>
+                    </m:d>
+                  </m:oMath>
+                </a14:m>
+                <a:r>
+                  <a:rPr lang="en-US" dirty="0"/>
+                  <a:t>  </a:t>
+                </a:r>
+              </a:p>
+              <a:p>
+                <a:r>
+                  <a:rPr lang="en-US" dirty="0">
+                    <a:solidFill>
+                      <a:schemeClr val="accent1">
+                        <a:lumMod val="60000"/>
+                        <a:lumOff val="40000"/>
+                      </a:schemeClr>
+                    </a:solidFill>
+                  </a:rPr>
+                  <a:t>Example</a:t>
+                </a:r>
+                <a:r>
+                  <a:rPr lang="en-US" dirty="0"/>
+                  <a:t>:  Credit assessment</a:t>
+                </a:r>
+              </a:p>
+              <a:p>
+                <a:pPr lvl="1"/>
+                <a:r>
+                  <a:rPr lang="en-US" dirty="0"/>
+                  <a:t>Target:  customer is high-risk or low-risk</a:t>
+                </a:r>
+              </a:p>
+              <a:p>
+                <a:pPr lvl="1"/>
+                <a:r>
+                  <a:rPr lang="en-US" dirty="0"/>
+                  <a:t>Features:  income &amp; saving </a:t>
+                </a:r>
+                <a14:m>
+                  <m:oMath xmlns:m="http://schemas.openxmlformats.org/officeDocument/2006/math">
+                    <m:r>
+                      <a:rPr lang="en-US" b="1" i="1" smtClean="0">
+                        <a:latin typeface="Cambria Math" panose="02040503050406030204" pitchFamily="18" charset="0"/>
+                      </a:rPr>
+                      <m:t>𝒙</m:t>
                     </m:r>
                     <m:r>
                       <a:rPr lang="en-US" b="0" i="1" smtClean="0">
@@ -6588,7 +6816,7 @@
             </p:txBody>
           </p:sp>
         </mc:Choice>
-        <mc:Fallback xmlns="">
+        <mc:Fallback>
           <p:sp>
             <p:nvSpPr>
               <p:cNvPr id="3" name="Content Placeholder 2"/>
@@ -6607,7 +6835,7 @@
               <a:blipFill>
                 <a:blip r:embed="rId2"/>
                 <a:stretch>
-                  <a:fillRect l="-2198" t="-1549"/>
+                  <a:fillRect l="-2198" t="-2113"/>
                 </a:stretch>
               </a:blipFill>
             </p:spPr>
@@ -6643,7 +6871,7 @@
           <a:p>
             <a:fld id="{629637A9-119A-49DA-BD12-AAC58B377D80}" type="slidenum">
               <a:rPr lang="en-US" smtClean="0"/>
-              <a:t>16</a:t>
+              <a:t>17</a:t>
             </a:fld>
             <a:endParaRPr lang="en-US" dirty="0"/>
           </a:p>
@@ -6674,6 +6902,423 @@
           </a:prstGeom>
         </p:spPr>
       </p:pic>
+      <p:grpSp>
+        <p:nvGrpSpPr>
+          <p:cNvPr id="16" name="Group 15">
+            <a:extLst>
+              <a:ext uri="{FF2B5EF4-FFF2-40B4-BE49-F238E27FC236}">
+                <a16:creationId xmlns:a16="http://schemas.microsoft.com/office/drawing/2014/main" id="{776D7AF9-0B69-459C-A1D4-9D6A3476DEC8}"/>
+              </a:ext>
+            </a:extLst>
+          </p:cNvPr>
+          <p:cNvGrpSpPr/>
+          <p:nvPr/>
+        </p:nvGrpSpPr>
+        <p:grpSpPr>
+          <a:xfrm>
+            <a:off x="7357620" y="1539277"/>
+            <a:ext cx="3526838" cy="3374063"/>
+            <a:chOff x="7357620" y="1539277"/>
+            <a:chExt cx="3526838" cy="3374063"/>
+          </a:xfrm>
+        </p:grpSpPr>
+        <p:sp>
+          <p:nvSpPr>
+            <p:cNvPr id="6" name="TextBox 5">
+              <a:extLst>
+                <a:ext uri="{FF2B5EF4-FFF2-40B4-BE49-F238E27FC236}">
+                  <a16:creationId xmlns:a16="http://schemas.microsoft.com/office/drawing/2014/main" id="{84FD72D9-56B4-4B4A-B58B-6CDCA58A5380}"/>
+                </a:ext>
+              </a:extLst>
+            </p:cNvPr>
+            <p:cNvSpPr txBox="1"/>
+            <p:nvPr/>
+          </p:nvSpPr>
+          <p:spPr>
+            <a:xfrm rot="16200000">
+              <a:off x="7255460" y="1792071"/>
+              <a:ext cx="874920" cy="369332"/>
+            </a:xfrm>
+            <a:prstGeom prst="rect">
+              <a:avLst/>
+            </a:prstGeom>
+            <a:solidFill>
+              <a:schemeClr val="bg1"/>
+            </a:solidFill>
+          </p:spPr>
+          <p:txBody>
+            <a:bodyPr wrap="none" rtlCol="0">
+              <a:spAutoFit/>
+            </a:bodyPr>
+            <a:lstStyle/>
+            <a:p>
+              <a:r>
+                <a:rPr lang="en-US" dirty="0">
+                  <a:solidFill>
+                    <a:schemeClr val="accent1">
+                      <a:lumMod val="60000"/>
+                      <a:lumOff val="40000"/>
+                    </a:schemeClr>
+                  </a:solidFill>
+                </a:rPr>
+                <a:t>Savings</a:t>
+              </a:r>
+            </a:p>
+          </p:txBody>
+        </p:sp>
+        <p:sp>
+          <p:nvSpPr>
+            <p:cNvPr id="8" name="TextBox 7">
+              <a:extLst>
+                <a:ext uri="{FF2B5EF4-FFF2-40B4-BE49-F238E27FC236}">
+                  <a16:creationId xmlns:a16="http://schemas.microsoft.com/office/drawing/2014/main" id="{35DC50AB-3938-49DE-B67D-69059B6C0EF9}"/>
+                </a:ext>
+              </a:extLst>
+            </p:cNvPr>
+            <p:cNvSpPr txBox="1"/>
+            <p:nvPr/>
+          </p:nvSpPr>
+          <p:spPr>
+            <a:xfrm>
+              <a:off x="10002806" y="4442718"/>
+              <a:ext cx="881652" cy="369332"/>
+            </a:xfrm>
+            <a:prstGeom prst="rect">
+              <a:avLst/>
+            </a:prstGeom>
+            <a:solidFill>
+              <a:schemeClr val="bg1"/>
+            </a:solidFill>
+          </p:spPr>
+          <p:txBody>
+            <a:bodyPr wrap="none" rtlCol="0">
+              <a:spAutoFit/>
+            </a:bodyPr>
+            <a:lstStyle/>
+            <a:p>
+              <a:r>
+                <a:rPr lang="en-US" dirty="0">
+                  <a:solidFill>
+                    <a:schemeClr val="accent1">
+                      <a:lumMod val="60000"/>
+                      <a:lumOff val="40000"/>
+                    </a:schemeClr>
+                  </a:solidFill>
+                </a:rPr>
+                <a:t>Income</a:t>
+              </a:r>
+            </a:p>
+          </p:txBody>
+        </p:sp>
+        <mc:AlternateContent xmlns:mc="http://schemas.openxmlformats.org/markup-compatibility/2006">
+          <mc:Choice xmlns:a14="http://schemas.microsoft.com/office/drawing/2010/main" Requires="a14">
+            <p:sp>
+              <p:nvSpPr>
+                <p:cNvPr id="9" name="TextBox 8">
+                  <a:extLst>
+                    <a:ext uri="{FF2B5EF4-FFF2-40B4-BE49-F238E27FC236}">
+                      <a16:creationId xmlns:a16="http://schemas.microsoft.com/office/drawing/2014/main" id="{342640AD-092E-4329-AE7A-F2B490358F63}"/>
+                    </a:ext>
+                  </a:extLst>
+                </p:cNvPr>
+                <p:cNvSpPr txBox="1"/>
+                <p:nvPr/>
+              </p:nvSpPr>
+              <p:spPr>
+                <a:xfrm>
+                  <a:off x="8766507" y="4544008"/>
+                  <a:ext cx="460767" cy="369332"/>
+                </a:xfrm>
+                <a:prstGeom prst="rect">
+                  <a:avLst/>
+                </a:prstGeom>
+                <a:solidFill>
+                  <a:schemeClr val="bg1"/>
+                </a:solidFill>
+              </p:spPr>
+              <p:txBody>
+                <a:bodyPr wrap="none" rtlCol="0">
+                  <a:spAutoFit/>
+                </a:bodyPr>
+                <a:lstStyle/>
+                <a:p>
+                  <a14:m>
+                    <m:oMathPara xmlns:m="http://schemas.openxmlformats.org/officeDocument/2006/math">
+                      <m:oMathParaPr>
+                        <m:jc m:val="centerGroup"/>
+                      </m:oMathParaPr>
+                      <m:oMath xmlns:m="http://schemas.openxmlformats.org/officeDocument/2006/math">
+                        <m:sSub>
+                          <m:sSubPr>
+                            <m:ctrlPr>
+                              <a:rPr lang="es-ES" b="0" i="1" smtClean="0">
+                                <a:latin typeface="Cambria Math" panose="02040503050406030204" pitchFamily="18" charset="0"/>
+                              </a:rPr>
+                            </m:ctrlPr>
+                          </m:sSubPr>
+                          <m:e>
+                            <m:r>
+                              <a:rPr lang="es-ES" b="0" i="1" smtClean="0">
+                                <a:latin typeface="Cambria Math" panose="02040503050406030204" pitchFamily="18" charset="0"/>
+                              </a:rPr>
+                              <m:t>𝑥</m:t>
+                            </m:r>
+                          </m:e>
+                          <m:sub>
+                            <m:r>
+                              <a:rPr lang="es-ES" b="0" i="1" smtClean="0">
+                                <a:latin typeface="Cambria Math" panose="02040503050406030204" pitchFamily="18" charset="0"/>
+                              </a:rPr>
+                              <m:t>1</m:t>
+                            </m:r>
+                          </m:sub>
+                        </m:sSub>
+                      </m:oMath>
+                    </m:oMathPara>
+                  </a14:m>
+                  <a:endParaRPr lang="en-US" dirty="0"/>
+                </a:p>
+              </p:txBody>
+            </p:sp>
+          </mc:Choice>
+          <mc:Fallback>
+            <p:sp>
+              <p:nvSpPr>
+                <p:cNvPr id="9" name="TextBox 8">
+                  <a:extLst>
+                    <a:ext uri="{FF2B5EF4-FFF2-40B4-BE49-F238E27FC236}">
+                      <a16:creationId xmlns:a16="http://schemas.microsoft.com/office/drawing/2014/main" id="{342640AD-092E-4329-AE7A-F2B490358F63}"/>
+                    </a:ext>
+                  </a:extLst>
+                </p:cNvPr>
+                <p:cNvSpPr txBox="1">
+                  <a:spLocks noRot="1" noChangeAspect="1" noMove="1" noResize="1" noEditPoints="1" noAdjustHandles="1" noChangeArrowheads="1" noChangeShapeType="1" noTextEdit="1"/>
+                </p:cNvSpPr>
+                <p:nvPr/>
+              </p:nvSpPr>
+              <p:spPr>
+                <a:xfrm>
+                  <a:off x="8766507" y="4544008"/>
+                  <a:ext cx="460767" cy="369332"/>
+                </a:xfrm>
+                <a:prstGeom prst="rect">
+                  <a:avLst/>
+                </a:prstGeom>
+                <a:blipFill>
+                  <a:blip r:embed="rId4"/>
+                  <a:stretch>
+                    <a:fillRect/>
+                  </a:stretch>
+                </a:blipFill>
+              </p:spPr>
+              <p:txBody>
+                <a:bodyPr/>
+                <a:lstStyle/>
+                <a:p>
+                  <a:r>
+                    <a:rPr lang="en-US">
+                      <a:noFill/>
+                    </a:rPr>
+                    <a:t> </a:t>
+                  </a:r>
+                </a:p>
+              </p:txBody>
+            </p:sp>
+          </mc:Fallback>
+        </mc:AlternateContent>
+        <mc:AlternateContent xmlns:mc="http://schemas.openxmlformats.org/markup-compatibility/2006">
+          <mc:Choice xmlns:a14="http://schemas.microsoft.com/office/drawing/2010/main" Requires="a14">
+            <p:sp>
+              <p:nvSpPr>
+                <p:cNvPr id="11" name="TextBox 10">
+                  <a:extLst>
+                    <a:ext uri="{FF2B5EF4-FFF2-40B4-BE49-F238E27FC236}">
+                      <a16:creationId xmlns:a16="http://schemas.microsoft.com/office/drawing/2014/main" id="{8B0C652C-C226-4DB3-894F-6814965BD6EA}"/>
+                    </a:ext>
+                  </a:extLst>
+                </p:cNvPr>
+                <p:cNvSpPr txBox="1"/>
+                <p:nvPr/>
+              </p:nvSpPr>
+              <p:spPr>
+                <a:xfrm flipH="1">
+                  <a:off x="7357620" y="3243791"/>
+                  <a:ext cx="519966" cy="369332"/>
+                </a:xfrm>
+                <a:prstGeom prst="rect">
+                  <a:avLst/>
+                </a:prstGeom>
+                <a:solidFill>
+                  <a:schemeClr val="bg1"/>
+                </a:solidFill>
+              </p:spPr>
+              <p:txBody>
+                <a:bodyPr wrap="square" rtlCol="0">
+                  <a:spAutoFit/>
+                </a:bodyPr>
+                <a:lstStyle/>
+                <a:p>
+                  <a:pPr/>
+                  <a14:m>
+                    <m:oMathPara xmlns:m="http://schemas.openxmlformats.org/officeDocument/2006/math">
+                      <m:oMathParaPr>
+                        <m:jc m:val="centerGroup"/>
+                      </m:oMathParaPr>
+                      <m:oMath xmlns:m="http://schemas.openxmlformats.org/officeDocument/2006/math">
+                        <m:sSub>
+                          <m:sSubPr>
+                            <m:ctrlPr>
+                              <a:rPr lang="es-ES" b="0" i="1" smtClean="0">
+                                <a:latin typeface="Cambria Math" panose="02040503050406030204" pitchFamily="18" charset="0"/>
+                              </a:rPr>
+                            </m:ctrlPr>
+                          </m:sSubPr>
+                          <m:e>
+                            <m:r>
+                              <a:rPr lang="es-ES" b="0" i="1" smtClean="0">
+                                <a:latin typeface="Cambria Math" panose="02040503050406030204" pitchFamily="18" charset="0"/>
+                              </a:rPr>
+                              <m:t>𝑥</m:t>
+                            </m:r>
+                          </m:e>
+                          <m:sub>
+                            <m:r>
+                              <a:rPr lang="es-ES" b="0" i="1" smtClean="0">
+                                <a:latin typeface="Cambria Math" panose="02040503050406030204" pitchFamily="18" charset="0"/>
+                              </a:rPr>
+                              <m:t>2</m:t>
+                            </m:r>
+                          </m:sub>
+                        </m:sSub>
+                      </m:oMath>
+                    </m:oMathPara>
+                  </a14:m>
+                  <a:endParaRPr lang="en-US" dirty="0"/>
+                </a:p>
+              </p:txBody>
+            </p:sp>
+          </mc:Choice>
+          <mc:Fallback>
+            <p:sp>
+              <p:nvSpPr>
+                <p:cNvPr id="11" name="TextBox 10">
+                  <a:extLst>
+                    <a:ext uri="{FF2B5EF4-FFF2-40B4-BE49-F238E27FC236}">
+                      <a16:creationId xmlns:a16="http://schemas.microsoft.com/office/drawing/2014/main" id="{8B0C652C-C226-4DB3-894F-6814965BD6EA}"/>
+                    </a:ext>
+                  </a:extLst>
+                </p:cNvPr>
+                <p:cNvSpPr txBox="1">
+                  <a:spLocks noRot="1" noChangeAspect="1" noMove="1" noResize="1" noEditPoints="1" noAdjustHandles="1" noChangeArrowheads="1" noChangeShapeType="1" noTextEdit="1"/>
+                </p:cNvSpPr>
+                <p:nvPr/>
+              </p:nvSpPr>
+              <p:spPr>
+                <a:xfrm flipH="1">
+                  <a:off x="7357620" y="3243791"/>
+                  <a:ext cx="519966" cy="369332"/>
+                </a:xfrm>
+                <a:prstGeom prst="rect">
+                  <a:avLst/>
+                </a:prstGeom>
+                <a:blipFill>
+                  <a:blip r:embed="rId5"/>
+                  <a:stretch>
+                    <a:fillRect/>
+                  </a:stretch>
+                </a:blipFill>
+              </p:spPr>
+              <p:txBody>
+                <a:bodyPr/>
+                <a:lstStyle/>
+                <a:p>
+                  <a:r>
+                    <a:rPr lang="en-US">
+                      <a:noFill/>
+                    </a:rPr>
+                    <a:t> </a:t>
+                  </a:r>
+                </a:p>
+              </p:txBody>
+            </p:sp>
+          </mc:Fallback>
+        </mc:AlternateContent>
+        <p:sp>
+          <p:nvSpPr>
+            <p:cNvPr id="13" name="TextBox 12">
+              <a:extLst>
+                <a:ext uri="{FF2B5EF4-FFF2-40B4-BE49-F238E27FC236}">
+                  <a16:creationId xmlns:a16="http://schemas.microsoft.com/office/drawing/2014/main" id="{64BE2285-20DC-4912-B2B2-BF0DB875A9F1}"/>
+                </a:ext>
+              </a:extLst>
+            </p:cNvPr>
+            <p:cNvSpPr txBox="1"/>
+            <p:nvPr/>
+          </p:nvSpPr>
+          <p:spPr>
+            <a:xfrm>
+              <a:off x="8004311" y="3238521"/>
+              <a:ext cx="992579" cy="369332"/>
+            </a:xfrm>
+            <a:prstGeom prst="rect">
+              <a:avLst/>
+            </a:prstGeom>
+            <a:solidFill>
+              <a:schemeClr val="bg1"/>
+            </a:solidFill>
+          </p:spPr>
+          <p:txBody>
+            <a:bodyPr wrap="none" rtlCol="0">
+              <a:spAutoFit/>
+            </a:bodyPr>
+            <a:lstStyle/>
+            <a:p>
+              <a:pPr/>
+              <a:r>
+                <a:rPr lang="en-US" dirty="0"/>
+                <a:t>High risk</a:t>
+              </a:r>
+            </a:p>
+          </p:txBody>
+        </p:sp>
+        <p:sp>
+          <p:nvSpPr>
+            <p:cNvPr id="15" name="TextBox 14">
+              <a:extLst>
+                <a:ext uri="{FF2B5EF4-FFF2-40B4-BE49-F238E27FC236}">
+                  <a16:creationId xmlns:a16="http://schemas.microsoft.com/office/drawing/2014/main" id="{3C2B20AD-D234-47ED-AD34-06479784C99A}"/>
+                </a:ext>
+              </a:extLst>
+            </p:cNvPr>
+            <p:cNvSpPr txBox="1"/>
+            <p:nvPr/>
+          </p:nvSpPr>
+          <p:spPr>
+            <a:xfrm>
+              <a:off x="9666240" y="1708591"/>
+              <a:ext cx="948401" cy="369332"/>
+            </a:xfrm>
+            <a:prstGeom prst="rect">
+              <a:avLst/>
+            </a:prstGeom>
+            <a:solidFill>
+              <a:schemeClr val="bg1"/>
+            </a:solidFill>
+          </p:spPr>
+          <p:txBody>
+            <a:bodyPr wrap="none" rtlCol="0">
+              <a:spAutoFit/>
+            </a:bodyPr>
+            <a:lstStyle/>
+            <a:p>
+              <a:r>
+                <a:rPr lang="en-US" dirty="0"/>
+                <a:t>Low risk</a:t>
+              </a:r>
+            </a:p>
+          </p:txBody>
+        </p:sp>
+      </p:grpSp>
     </p:spTree>
     <p:extLst>
       <p:ext uri="{BB962C8B-B14F-4D97-AF65-F5344CB8AC3E}">
@@ -6684,10 +7329,557 @@
   <p:clrMapOvr>
     <a:masterClrMapping/>
   </p:clrMapOvr>
+  <p:timing>
+    <p:tnLst>
+      <p:par>
+        <p:cTn id="1" dur="indefinite" restart="never" nodeType="tmRoot">
+          <p:childTnLst>
+            <p:seq concurrent="1" nextAc="seek">
+              <p:cTn id="2" dur="indefinite" nodeType="mainSeq">
+                <p:childTnLst>
+                  <p:par>
+                    <p:cTn id="3" fill="hold">
+                      <p:stCondLst>
+                        <p:cond delay="indefinite"/>
+                        <p:cond evt="onBegin" delay="0">
+                          <p:tn val="2"/>
+                        </p:cond>
+                      </p:stCondLst>
+                      <p:childTnLst>
+                        <p:par>
+                          <p:cTn id="4" fill="hold">
+                            <p:stCondLst>
+                              <p:cond delay="0"/>
+                            </p:stCondLst>
+                            <p:childTnLst>
+                              <p:par>
+                                <p:cTn id="5" presetID="1" presetClass="entr" presetSubtype="0" fill="hold" nodeType="withEffect">
+                                  <p:stCondLst>
+                                    <p:cond delay="0"/>
+                                  </p:stCondLst>
+                                  <p:childTnLst>
+                                    <p:set>
+                                      <p:cBhvr>
+                                        <p:cTn id="6" dur="1" fill="hold">
+                                          <p:stCondLst>
+                                            <p:cond delay="0"/>
+                                          </p:stCondLst>
+                                        </p:cTn>
+                                        <p:tgtEl>
+                                          <p:spTgt spid="3">
+                                            <p:txEl>
+                                              <p:pRg st="0" end="0"/>
+                                            </p:txEl>
+                                          </p:spTgt>
+                                        </p:tgtEl>
+                                        <p:attrNameLst>
+                                          <p:attrName>style.visibility</p:attrName>
+                                        </p:attrNameLst>
+                                      </p:cBhvr>
+                                      <p:to>
+                                        <p:strVal val="visible"/>
+                                      </p:to>
+                                    </p:set>
+                                  </p:childTnLst>
+                                </p:cTn>
+                              </p:par>
+                              <p:par>
+                                <p:cTn id="7" presetID="1" presetClass="entr" presetSubtype="0" fill="hold" nodeType="withEffect">
+                                  <p:stCondLst>
+                                    <p:cond delay="0"/>
+                                  </p:stCondLst>
+                                  <p:childTnLst>
+                                    <p:set>
+                                      <p:cBhvr>
+                                        <p:cTn id="8" dur="1" fill="hold">
+                                          <p:stCondLst>
+                                            <p:cond delay="0"/>
+                                          </p:stCondLst>
+                                        </p:cTn>
+                                        <p:tgtEl>
+                                          <p:spTgt spid="3">
+                                            <p:txEl>
+                                              <p:pRg st="1" end="1"/>
+                                            </p:txEl>
+                                          </p:spTgt>
+                                        </p:tgtEl>
+                                        <p:attrNameLst>
+                                          <p:attrName>style.visibility</p:attrName>
+                                        </p:attrNameLst>
+                                      </p:cBhvr>
+                                      <p:to>
+                                        <p:strVal val="visible"/>
+                                      </p:to>
+                                    </p:set>
+                                  </p:childTnLst>
+                                </p:cTn>
+                              </p:par>
+                            </p:childTnLst>
+                          </p:cTn>
+                        </p:par>
+                      </p:childTnLst>
+                    </p:cTn>
+                  </p:par>
+                  <p:par>
+                    <p:cTn id="9" fill="hold">
+                      <p:stCondLst>
+                        <p:cond delay="indefinite"/>
+                      </p:stCondLst>
+                      <p:childTnLst>
+                        <p:par>
+                          <p:cTn id="10" fill="hold">
+                            <p:stCondLst>
+                              <p:cond delay="0"/>
+                            </p:stCondLst>
+                            <p:childTnLst>
+                              <p:par>
+                                <p:cTn id="11" presetID="1" presetClass="entr" presetSubtype="0" fill="hold" nodeType="clickEffect">
+                                  <p:stCondLst>
+                                    <p:cond delay="0"/>
+                                  </p:stCondLst>
+                                  <p:childTnLst>
+                                    <p:set>
+                                      <p:cBhvr>
+                                        <p:cTn id="12" dur="1" fill="hold">
+                                          <p:stCondLst>
+                                            <p:cond delay="0"/>
+                                          </p:stCondLst>
+                                        </p:cTn>
+                                        <p:tgtEl>
+                                          <p:spTgt spid="3">
+                                            <p:txEl>
+                                              <p:pRg st="2" end="2"/>
+                                            </p:txEl>
+                                          </p:spTgt>
+                                        </p:tgtEl>
+                                        <p:attrNameLst>
+                                          <p:attrName>style.visibility</p:attrName>
+                                        </p:attrNameLst>
+                                      </p:cBhvr>
+                                      <p:to>
+                                        <p:strVal val="visible"/>
+                                      </p:to>
+                                    </p:set>
+                                  </p:childTnLst>
+                                </p:cTn>
+                              </p:par>
+                              <p:par>
+                                <p:cTn id="13" presetID="1" presetClass="entr" presetSubtype="0" fill="hold" nodeType="withEffect">
+                                  <p:stCondLst>
+                                    <p:cond delay="0"/>
+                                  </p:stCondLst>
+                                  <p:childTnLst>
+                                    <p:set>
+                                      <p:cBhvr>
+                                        <p:cTn id="14" dur="1" fill="hold">
+                                          <p:stCondLst>
+                                            <p:cond delay="0"/>
+                                          </p:stCondLst>
+                                        </p:cTn>
+                                        <p:tgtEl>
+                                          <p:spTgt spid="3">
+                                            <p:txEl>
+                                              <p:pRg st="3" end="3"/>
+                                            </p:txEl>
+                                          </p:spTgt>
+                                        </p:tgtEl>
+                                        <p:attrNameLst>
+                                          <p:attrName>style.visibility</p:attrName>
+                                        </p:attrNameLst>
+                                      </p:cBhvr>
+                                      <p:to>
+                                        <p:strVal val="visible"/>
+                                      </p:to>
+                                    </p:set>
+                                  </p:childTnLst>
+                                </p:cTn>
+                              </p:par>
+                              <p:par>
+                                <p:cTn id="15" presetID="1" presetClass="entr" presetSubtype="0" fill="hold" nodeType="withEffect">
+                                  <p:stCondLst>
+                                    <p:cond delay="0"/>
+                                  </p:stCondLst>
+                                  <p:childTnLst>
+                                    <p:set>
+                                      <p:cBhvr>
+                                        <p:cTn id="16" dur="1" fill="hold">
+                                          <p:stCondLst>
+                                            <p:cond delay="0"/>
+                                          </p:stCondLst>
+                                        </p:cTn>
+                                        <p:tgtEl>
+                                          <p:spTgt spid="3">
+                                            <p:txEl>
+                                              <p:pRg st="4" end="4"/>
+                                            </p:txEl>
+                                          </p:spTgt>
+                                        </p:tgtEl>
+                                        <p:attrNameLst>
+                                          <p:attrName>style.visibility</p:attrName>
+                                        </p:attrNameLst>
+                                      </p:cBhvr>
+                                      <p:to>
+                                        <p:strVal val="visible"/>
+                                      </p:to>
+                                    </p:set>
+                                  </p:childTnLst>
+                                </p:cTn>
+                              </p:par>
+                            </p:childTnLst>
+                          </p:cTn>
+                        </p:par>
+                      </p:childTnLst>
+                    </p:cTn>
+                  </p:par>
+                  <p:par>
+                    <p:cTn id="17" fill="hold">
+                      <p:stCondLst>
+                        <p:cond delay="indefinite"/>
+                      </p:stCondLst>
+                      <p:childTnLst>
+                        <p:par>
+                          <p:cTn id="18" fill="hold">
+                            <p:stCondLst>
+                              <p:cond delay="0"/>
+                            </p:stCondLst>
+                            <p:childTnLst>
+                              <p:par>
+                                <p:cTn id="19" presetID="1" presetClass="entr" presetSubtype="0" fill="hold" nodeType="clickEffect">
+                                  <p:stCondLst>
+                                    <p:cond delay="0"/>
+                                  </p:stCondLst>
+                                  <p:childTnLst>
+                                    <p:set>
+                                      <p:cBhvr>
+                                        <p:cTn id="20" dur="1" fill="hold">
+                                          <p:stCondLst>
+                                            <p:cond delay="0"/>
+                                          </p:stCondLst>
+                                        </p:cTn>
+                                        <p:tgtEl>
+                                          <p:spTgt spid="3">
+                                            <p:txEl>
+                                              <p:pRg st="5" end="5"/>
+                                            </p:txEl>
+                                          </p:spTgt>
+                                        </p:tgtEl>
+                                        <p:attrNameLst>
+                                          <p:attrName>style.visibility</p:attrName>
+                                        </p:attrNameLst>
+                                      </p:cBhvr>
+                                      <p:to>
+                                        <p:strVal val="visible"/>
+                                      </p:to>
+                                    </p:set>
+                                  </p:childTnLst>
+                                </p:cTn>
+                              </p:par>
+                              <p:par>
+                                <p:cTn id="21" presetID="10" presetClass="entr" presetSubtype="0" fill="hold" nodeType="withEffect">
+                                  <p:stCondLst>
+                                    <p:cond delay="0"/>
+                                  </p:stCondLst>
+                                  <p:childTnLst>
+                                    <p:set>
+                                      <p:cBhvr>
+                                        <p:cTn id="22" dur="1" fill="hold">
+                                          <p:stCondLst>
+                                            <p:cond delay="0"/>
+                                          </p:stCondLst>
+                                        </p:cTn>
+                                        <p:tgtEl>
+                                          <p:spTgt spid="5"/>
+                                        </p:tgtEl>
+                                        <p:attrNameLst>
+                                          <p:attrName>style.visibility</p:attrName>
+                                        </p:attrNameLst>
+                                      </p:cBhvr>
+                                      <p:to>
+                                        <p:strVal val="visible"/>
+                                      </p:to>
+                                    </p:set>
+                                    <p:animEffect transition="in" filter="fade">
+                                      <p:cBhvr>
+                                        <p:cTn id="23" dur="500"/>
+                                        <p:tgtEl>
+                                          <p:spTgt spid="5"/>
+                                        </p:tgtEl>
+                                      </p:cBhvr>
+                                    </p:animEffect>
+                                  </p:childTnLst>
+                                </p:cTn>
+                              </p:par>
+                              <p:par>
+                                <p:cTn id="24" presetID="10" presetClass="entr" presetSubtype="0" fill="hold" nodeType="withEffect">
+                                  <p:stCondLst>
+                                    <p:cond delay="0"/>
+                                  </p:stCondLst>
+                                  <p:childTnLst>
+                                    <p:set>
+                                      <p:cBhvr>
+                                        <p:cTn id="25" dur="1" fill="hold">
+                                          <p:stCondLst>
+                                            <p:cond delay="0"/>
+                                          </p:stCondLst>
+                                        </p:cTn>
+                                        <p:tgtEl>
+                                          <p:spTgt spid="16"/>
+                                        </p:tgtEl>
+                                        <p:attrNameLst>
+                                          <p:attrName>style.visibility</p:attrName>
+                                        </p:attrNameLst>
+                                      </p:cBhvr>
+                                      <p:to>
+                                        <p:strVal val="visible"/>
+                                      </p:to>
+                                    </p:set>
+                                    <p:animEffect transition="in" filter="fade">
+                                      <p:cBhvr>
+                                        <p:cTn id="26" dur="500"/>
+                                        <p:tgtEl>
+                                          <p:spTgt spid="16"/>
+                                        </p:tgtEl>
+                                      </p:cBhvr>
+                                    </p:animEffect>
+                                  </p:childTnLst>
+                                </p:cTn>
+                              </p:par>
+                              <p:par>
+                                <p:cTn id="27" presetID="1" presetClass="entr" presetSubtype="0" fill="hold" nodeType="withEffect">
+                                  <p:stCondLst>
+                                    <p:cond delay="0"/>
+                                  </p:stCondLst>
+                                  <p:childTnLst>
+                                    <p:set>
+                                      <p:cBhvr>
+                                        <p:cTn id="28" dur="1" fill="hold">
+                                          <p:stCondLst>
+                                            <p:cond delay="0"/>
+                                          </p:stCondLst>
+                                        </p:cTn>
+                                        <p:tgtEl>
+                                          <p:spTgt spid="3">
+                                            <p:txEl>
+                                              <p:pRg st="6" end="6"/>
+                                            </p:txEl>
+                                          </p:spTgt>
+                                        </p:tgtEl>
+                                        <p:attrNameLst>
+                                          <p:attrName>style.visibility</p:attrName>
+                                        </p:attrNameLst>
+                                      </p:cBhvr>
+                                      <p:to>
+                                        <p:strVal val="visible"/>
+                                      </p:to>
+                                    </p:set>
+                                  </p:childTnLst>
+                                </p:cTn>
+                              </p:par>
+                              <p:par>
+                                <p:cTn id="29" presetID="1" presetClass="entr" presetSubtype="0" fill="hold" nodeType="withEffect">
+                                  <p:stCondLst>
+                                    <p:cond delay="0"/>
+                                  </p:stCondLst>
+                                  <p:childTnLst>
+                                    <p:set>
+                                      <p:cBhvr>
+                                        <p:cTn id="30" dur="1" fill="hold">
+                                          <p:stCondLst>
+                                            <p:cond delay="0"/>
+                                          </p:stCondLst>
+                                        </p:cTn>
+                                        <p:tgtEl>
+                                          <p:spTgt spid="3">
+                                            <p:txEl>
+                                              <p:pRg st="7" end="7"/>
+                                            </p:txEl>
+                                          </p:spTgt>
+                                        </p:tgtEl>
+                                        <p:attrNameLst>
+                                          <p:attrName>style.visibility</p:attrName>
+                                        </p:attrNameLst>
+                                      </p:cBhvr>
+                                      <p:to>
+                                        <p:strVal val="visible"/>
+                                      </p:to>
+                                    </p:set>
+                                  </p:childTnLst>
+                                </p:cTn>
+                              </p:par>
+                            </p:childTnLst>
+                          </p:cTn>
+                        </p:par>
+                      </p:childTnLst>
+                    </p:cTn>
+                  </p:par>
+                  <p:par>
+                    <p:cTn id="31" fill="hold">
+                      <p:stCondLst>
+                        <p:cond delay="indefinite"/>
+                      </p:stCondLst>
+                      <p:childTnLst>
+                        <p:par>
+                          <p:cTn id="32" fill="hold">
+                            <p:stCondLst>
+                              <p:cond delay="0"/>
+                            </p:stCondLst>
+                            <p:childTnLst>
+                              <p:par>
+                                <p:cTn id="33" presetID="1" presetClass="entr" presetSubtype="0" fill="hold" nodeType="clickEffect">
+                                  <p:stCondLst>
+                                    <p:cond delay="0"/>
+                                  </p:stCondLst>
+                                  <p:childTnLst>
+                                    <p:set>
+                                      <p:cBhvr>
+                                        <p:cTn id="34" dur="1" fill="hold">
+                                          <p:stCondLst>
+                                            <p:cond delay="0"/>
+                                          </p:stCondLst>
+                                        </p:cTn>
+                                        <p:tgtEl>
+                                          <p:spTgt spid="3">
+                                            <p:txEl>
+                                              <p:pRg st="8" end="8"/>
+                                            </p:txEl>
+                                          </p:spTgt>
+                                        </p:tgtEl>
+                                        <p:attrNameLst>
+                                          <p:attrName>style.visibility</p:attrName>
+                                        </p:attrNameLst>
+                                      </p:cBhvr>
+                                      <p:to>
+                                        <p:strVal val="visible"/>
+                                      </p:to>
+                                    </p:set>
+                                  </p:childTnLst>
+                                </p:cTn>
+                              </p:par>
+                              <p:par>
+                                <p:cTn id="35" presetID="1" presetClass="entr" presetSubtype="0" fill="hold" nodeType="withEffect">
+                                  <p:stCondLst>
+                                    <p:cond delay="0"/>
+                                  </p:stCondLst>
+                                  <p:childTnLst>
+                                    <p:set>
+                                      <p:cBhvr>
+                                        <p:cTn id="36" dur="1" fill="hold">
+                                          <p:stCondLst>
+                                            <p:cond delay="0"/>
+                                          </p:stCondLst>
+                                        </p:cTn>
+                                        <p:tgtEl>
+                                          <p:spTgt spid="3">
+                                            <p:txEl>
+                                              <p:pRg st="9" end="9"/>
+                                            </p:txEl>
+                                          </p:spTgt>
+                                        </p:tgtEl>
+                                        <p:attrNameLst>
+                                          <p:attrName>style.visibility</p:attrName>
+                                        </p:attrNameLst>
+                                      </p:cBhvr>
+                                      <p:to>
+                                        <p:strVal val="visible"/>
+                                      </p:to>
+                                    </p:set>
+                                  </p:childTnLst>
+                                </p:cTn>
+                              </p:par>
+                              <p:par>
+                                <p:cTn id="37" presetID="1" presetClass="entr" presetSubtype="0" fill="hold" nodeType="withEffect">
+                                  <p:stCondLst>
+                                    <p:cond delay="0"/>
+                                  </p:stCondLst>
+                                  <p:childTnLst>
+                                    <p:set>
+                                      <p:cBhvr>
+                                        <p:cTn id="38" dur="1" fill="hold">
+                                          <p:stCondLst>
+                                            <p:cond delay="0"/>
+                                          </p:stCondLst>
+                                        </p:cTn>
+                                        <p:tgtEl>
+                                          <p:spTgt spid="3">
+                                            <p:txEl>
+                                              <p:pRg st="10" end="10"/>
+                                            </p:txEl>
+                                          </p:spTgt>
+                                        </p:tgtEl>
+                                        <p:attrNameLst>
+                                          <p:attrName>style.visibility</p:attrName>
+                                        </p:attrNameLst>
+                                      </p:cBhvr>
+                                      <p:to>
+                                        <p:strVal val="visible"/>
+                                      </p:to>
+                                    </p:set>
+                                  </p:childTnLst>
+                                </p:cTn>
+                              </p:par>
+                              <p:par>
+                                <p:cTn id="39" presetID="1" presetClass="entr" presetSubtype="0" fill="hold" nodeType="withEffect">
+                                  <p:stCondLst>
+                                    <p:cond delay="0"/>
+                                  </p:stCondLst>
+                                  <p:childTnLst>
+                                    <p:set>
+                                      <p:cBhvr>
+                                        <p:cTn id="40" dur="1" fill="hold">
+                                          <p:stCondLst>
+                                            <p:cond delay="0"/>
+                                          </p:stCondLst>
+                                        </p:cTn>
+                                        <p:tgtEl>
+                                          <p:spTgt spid="3">
+                                            <p:txEl>
+                                              <p:pRg st="11" end="11"/>
+                                            </p:txEl>
+                                          </p:spTgt>
+                                        </p:tgtEl>
+                                        <p:attrNameLst>
+                                          <p:attrName>style.visibility</p:attrName>
+                                        </p:attrNameLst>
+                                      </p:cBhvr>
+                                      <p:to>
+                                        <p:strVal val="visible"/>
+                                      </p:to>
+                                    </p:set>
+                                  </p:childTnLst>
+                                </p:cTn>
+                              </p:par>
+                            </p:childTnLst>
+                          </p:cTn>
+                        </p:par>
+                      </p:childTnLst>
+                    </p:cTn>
+                  </p:par>
+                </p:childTnLst>
+              </p:cTn>
+              <p:prevCondLst>
+                <p:cond evt="onPrev" delay="0">
+                  <p:tgtEl>
+                    <p:sldTgt/>
+                  </p:tgtEl>
+                </p:cond>
+              </p:prevCondLst>
+              <p:nextCondLst>
+                <p:cond evt="onNext" delay="0">
+                  <p:tgtEl>
+                    <p:sldTgt/>
+                  </p:tgtEl>
+                </p:cond>
+              </p:nextCondLst>
+            </p:seq>
+          </p:childTnLst>
+        </p:cTn>
+      </p:par>
+    </p:tnLst>
+  </p:timing>
 </p:sld>
 </file>
 
-<file path=ppt/slides/slide17.xml><?xml version="1.0" encoding="utf-8"?>
+<file path=ppt/slides/slide18.xml><?xml version="1.0" encoding="utf-8"?>
 <p:sld xmlns:a="http://schemas.openxmlformats.org/drawingml/2006/main" xmlns:r="http://schemas.openxmlformats.org/officeDocument/2006/relationships" xmlns:p="http://schemas.openxmlformats.org/presentationml/2006/main">
   <p:cSld>
     <p:spTree>
@@ -6726,8 +7918,8 @@
           </a:p>
         </p:txBody>
       </p:sp>
-      <mc:AlternateContent xmlns:mc="http://schemas.openxmlformats.org/markup-compatibility/2006" xmlns:a14="http://schemas.microsoft.com/office/drawing/2010/main">
-        <mc:Choice Requires="a14">
+      <mc:AlternateContent xmlns:mc="http://schemas.openxmlformats.org/markup-compatibility/2006">
+        <mc:Choice xmlns:a14="http://schemas.microsoft.com/office/drawing/2010/main" Requires="a14">
           <p:sp>
             <p:nvSpPr>
               <p:cNvPr id="3" name="Content Placeholder 2"/>
@@ -6750,27 +7942,45 @@
               <a:p>
                 <a:r>
                   <a:rPr lang="en-US" dirty="0"/>
-                  <a:t>Target variable </a:t>
-                </a:r>
-                <a14:m>
-                  <m:oMath xmlns:m="http://schemas.openxmlformats.org/officeDocument/2006/math">
-                    <m:r>
-                      <a:rPr lang="en-US" b="0" i="1" smtClean="0">
-                        <a:latin typeface="Cambria Math" panose="02040503050406030204" pitchFamily="18" charset="0"/>
-                      </a:rPr>
-                      <m:t>𝑦</m:t>
-                    </m:r>
-                  </m:oMath>
-                </a14:m>
-                <a:r>
-                  <a:rPr lang="en-US" dirty="0"/>
-                  <a:t> is continuous-valued</a:t>
+                  <a:t>Also supervised learning</a:t>
                 </a:r>
               </a:p>
               <a:p>
                 <a:r>
                   <a:rPr lang="en-US" dirty="0"/>
-                  <a:t>Example:</a:t>
+                  <a:t>Predicting a </a:t>
+                </a:r>
+                <a:r>
+                  <a:rPr lang="en-US" dirty="0">
+                    <a:solidFill>
+                      <a:schemeClr val="accent1">
+                        <a:lumMod val="60000"/>
+                        <a:lumOff val="40000"/>
+                      </a:schemeClr>
+                    </a:solidFill>
+                  </a:rPr>
+                  <a:t>continuous-valued </a:t>
+                </a:r>
+                <a:r>
+                  <a:rPr lang="en-US" dirty="0"/>
+                  <a:t>target</a:t>
+                </a:r>
+              </a:p>
+              <a:p>
+                <a:r>
+                  <a:rPr lang="en-US" dirty="0">
+                    <a:solidFill>
+                      <a:schemeClr val="accent1">
+                        <a:lumMod val="60000"/>
+                        <a:lumOff val="40000"/>
+                      </a:schemeClr>
+                    </a:solidFill>
+                  </a:rPr>
+                  <a:t>Example</a:t>
+                </a:r>
+                <a:r>
+                  <a:rPr lang="en-US" dirty="0"/>
+                  <a:t>:</a:t>
                 </a:r>
               </a:p>
               <a:p>
@@ -6797,7 +8007,7 @@
                 </a14:m>
                 <a:r>
                   <a:rPr lang="en-US" dirty="0"/>
-                  <a:t>price of car</a:t>
+                  <a:t>happiness score (e.g. from surveys)</a:t>
                 </a:r>
               </a:p>
               <a:p>
@@ -6824,7 +8034,7 @@
                 </a14:m>
                 <a:r>
                   <a:rPr lang="en-US" dirty="0"/>
-                  <a:t> mileage, size, horsepower, ..</a:t>
+                  <a:t> income, country, age, …</a:t>
                 </a:r>
               </a:p>
               <a:p>
@@ -7010,7 +8220,7 @@
             </p:txBody>
           </p:sp>
         </mc:Choice>
-        <mc:Fallback xmlns="">
+        <mc:Fallback>
           <p:sp>
             <p:nvSpPr>
               <p:cNvPr id="3" name="Content Placeholder 2"/>
@@ -7026,7 +8236,7 @@
                 <a:off x="1097280" y="1539277"/>
                 <a:ext cx="4995871" cy="4329817"/>
               </a:xfrm>
-              <a:blipFill rotWithShape="0">
+              <a:blipFill>
                 <a:blip r:embed="rId2"/>
                 <a:stretch>
                   <a:fillRect l="-2927" t="-1549"/>
@@ -7065,37 +8275,353 @@
           <a:p>
             <a:fld id="{629637A9-119A-49DA-BD12-AAC58B377D80}" type="slidenum">
               <a:rPr lang="en-US" smtClean="0"/>
-              <a:t>17</a:t>
+              <a:t>18</a:t>
             </a:fld>
             <a:endParaRPr lang="en-US" dirty="0"/>
+          </a:p>
+        </p:txBody>
+      </p:sp>
+      <p:sp>
+        <p:nvSpPr>
+          <p:cNvPr id="6" name="TextBox 5">
+            <a:extLst>
+              <a:ext uri="{FF2B5EF4-FFF2-40B4-BE49-F238E27FC236}">
+                <a16:creationId xmlns:a16="http://schemas.microsoft.com/office/drawing/2014/main" id="{CF6EDD77-C308-45F9-BACA-EEB9DB7158C4}"/>
+              </a:ext>
+            </a:extLst>
+          </p:cNvPr>
+          <p:cNvSpPr txBox="1"/>
+          <p:nvPr/>
+        </p:nvSpPr>
+        <p:spPr>
+          <a:xfrm>
+            <a:off x="6037190" y="1477107"/>
+            <a:ext cx="1774717" cy="369332"/>
+          </a:xfrm>
+          <a:prstGeom prst="rect">
+            <a:avLst/>
+          </a:prstGeom>
+          <a:noFill/>
+        </p:spPr>
+        <p:txBody>
+          <a:bodyPr wrap="none" rtlCol="0">
+            <a:spAutoFit/>
+          </a:bodyPr>
+          <a:lstStyle/>
+          <a:p>
+            <a:r>
+              <a:rPr lang="en-US" dirty="0">
+                <a:solidFill>
+                  <a:schemeClr val="accent1">
+                    <a:lumMod val="60000"/>
+                    <a:lumOff val="40000"/>
+                  </a:schemeClr>
+                </a:solidFill>
+              </a:rPr>
+              <a:t>Happiness Score </a:t>
+            </a:r>
           </a:p>
         </p:txBody>
       </p:sp>
       <p:pic>
         <p:nvPicPr>
-          <p:cNvPr id="5" name="Picture 4"/>
+          <p:cNvPr id="1026" name="Picture 2" descr="Linear Regression in R | An Easy Step-by-Step Guide">
+            <a:extLst>
+              <a:ext uri="{FF2B5EF4-FFF2-40B4-BE49-F238E27FC236}">
+                <a16:creationId xmlns:a16="http://schemas.microsoft.com/office/drawing/2014/main" id="{BB9525B6-F1AB-46F5-95E5-ACD413B8295E}"/>
+              </a:ext>
+            </a:extLst>
+          </p:cNvPr>
           <p:cNvPicPr>
-            <a:picLocks noGrp="1" noChangeAspect="1" noChangeArrowheads="1"/>
+            <a:picLocks noChangeAspect="1" noChangeArrowheads="1"/>
           </p:cNvPicPr>
           <p:nvPr/>
         </p:nvPicPr>
         <p:blipFill>
-          <a:blip r:embed="rId3" cstate="print"/>
+          <a:blip r:embed="rId3">
+            <a:extLst>
+              <a:ext uri="{28A0092B-C50C-407E-A947-70E740481C1C}">
+                <a14:useLocalDpi xmlns:a14="http://schemas.microsoft.com/office/drawing/2010/main" val="0"/>
+              </a:ext>
+            </a:extLst>
+          </a:blip>
           <a:srcRect/>
           <a:stretch>
             <a:fillRect/>
           </a:stretch>
         </p:blipFill>
-        <p:spPr>
+        <p:spPr bwMode="auto">
           <a:xfrm>
-            <a:off x="7084374" y="1539277"/>
-            <a:ext cx="3904383" cy="3757151"/>
+            <a:off x="7201348" y="1888324"/>
+            <a:ext cx="4015992" cy="3631722"/>
           </a:xfrm>
           <a:prstGeom prst="rect">
             <a:avLst/>
           </a:prstGeom>
+          <a:noFill/>
+          <a:extLst>
+            <a:ext uri="{909E8E84-426E-40DD-AFC4-6F175D3DCCD1}">
+              <a14:hiddenFill xmlns:a14="http://schemas.microsoft.com/office/drawing/2010/main">
+                <a:solidFill>
+                  <a:srgbClr val="FFFFFF"/>
+                </a:solidFill>
+              </a14:hiddenFill>
+            </a:ext>
+          </a:extLst>
         </p:spPr>
       </p:pic>
+      <p:pic>
+        <p:nvPicPr>
+          <p:cNvPr id="1028" name="Picture 4" descr="True happiness isn't about being happy all the time">
+            <a:extLst>
+              <a:ext uri="{FF2B5EF4-FFF2-40B4-BE49-F238E27FC236}">
+                <a16:creationId xmlns:a16="http://schemas.microsoft.com/office/drawing/2014/main" id="{B8954763-01C1-47F6-B4D8-DA27777F2CE7}"/>
+              </a:ext>
+            </a:extLst>
+          </p:cNvPr>
+          <p:cNvPicPr>
+            <a:picLocks noChangeAspect="1" noChangeArrowheads="1"/>
+          </p:cNvPicPr>
+          <p:nvPr/>
+        </p:nvPicPr>
+        <p:blipFill rotWithShape="1">
+          <a:blip r:embed="rId4">
+            <a:extLst>
+              <a:ext uri="{28A0092B-C50C-407E-A947-70E740481C1C}">
+                <a14:useLocalDpi xmlns:a14="http://schemas.microsoft.com/office/drawing/2010/main" val="0"/>
+              </a:ext>
+            </a:extLst>
+          </a:blip>
+          <a:srcRect l="54178" t="21972" r="-133" b="22893"/>
+          <a:stretch/>
+        </p:blipFill>
+        <p:spPr bwMode="auto">
+          <a:xfrm>
+            <a:off x="5936292" y="1908609"/>
+            <a:ext cx="984877" cy="1181621"/>
+          </a:xfrm>
+          <a:prstGeom prst="rect">
+            <a:avLst/>
+          </a:prstGeom>
+          <a:noFill/>
+          <a:extLst>
+            <a:ext uri="{909E8E84-426E-40DD-AFC4-6F175D3DCCD1}">
+              <a14:hiddenFill xmlns:a14="http://schemas.microsoft.com/office/drawing/2010/main">
+                <a:solidFill>
+                  <a:srgbClr val="FFFFFF"/>
+                </a:solidFill>
+              </a14:hiddenFill>
+            </a:ext>
+          </a:extLst>
+        </p:spPr>
+      </p:pic>
+      <p:sp>
+        <p:nvSpPr>
+          <p:cNvPr id="7" name="TextBox 6">
+            <a:extLst>
+              <a:ext uri="{FF2B5EF4-FFF2-40B4-BE49-F238E27FC236}">
+                <a16:creationId xmlns:a16="http://schemas.microsoft.com/office/drawing/2014/main" id="{0B0276D8-365B-4D9B-B6E3-B39390245A64}"/>
+              </a:ext>
+            </a:extLst>
+          </p:cNvPr>
+          <p:cNvSpPr txBox="1"/>
+          <p:nvPr/>
+        </p:nvSpPr>
+        <p:spPr>
+          <a:xfrm>
+            <a:off x="10918394" y="5520046"/>
+            <a:ext cx="881652" cy="369332"/>
+          </a:xfrm>
+          <a:prstGeom prst="rect">
+            <a:avLst/>
+          </a:prstGeom>
+          <a:noFill/>
+        </p:spPr>
+        <p:txBody>
+          <a:bodyPr wrap="none" rtlCol="0">
+            <a:spAutoFit/>
+          </a:bodyPr>
+          <a:lstStyle/>
+          <a:p>
+            <a:r>
+              <a:rPr lang="en-US" dirty="0">
+                <a:solidFill>
+                  <a:schemeClr val="accent1">
+                    <a:lumMod val="60000"/>
+                    <a:lumOff val="40000"/>
+                  </a:schemeClr>
+                </a:solidFill>
+              </a:rPr>
+              <a:t>Income</a:t>
+            </a:r>
+          </a:p>
+        </p:txBody>
+      </p:sp>
+      <p:pic>
+        <p:nvPicPr>
+          <p:cNvPr id="1030" name="Picture 6" descr="United States Dollar Money United States One-dollar Bill Banknote ...">
+            <a:extLst>
+              <a:ext uri="{FF2B5EF4-FFF2-40B4-BE49-F238E27FC236}">
+                <a16:creationId xmlns:a16="http://schemas.microsoft.com/office/drawing/2014/main" id="{F702B0BC-CAEB-42BB-B1C0-D7BFE90776EC}"/>
+              </a:ext>
+            </a:extLst>
+          </p:cNvPr>
+          <p:cNvPicPr>
+            <a:picLocks noChangeAspect="1" noChangeArrowheads="1"/>
+          </p:cNvPicPr>
+          <p:nvPr/>
+        </p:nvPicPr>
+        <p:blipFill>
+          <a:blip r:embed="rId5">
+            <a:extLst>
+              <a:ext uri="{28A0092B-C50C-407E-A947-70E740481C1C}">
+                <a14:useLocalDpi xmlns:a14="http://schemas.microsoft.com/office/drawing/2010/main" val="0"/>
+              </a:ext>
+            </a:extLst>
+          </a:blip>
+          <a:srcRect/>
+          <a:stretch>
+            <a:fillRect/>
+          </a:stretch>
+        </p:blipFill>
+        <p:spPr bwMode="auto">
+          <a:xfrm>
+            <a:off x="10204346" y="4374023"/>
+            <a:ext cx="1428097" cy="1071073"/>
+          </a:xfrm>
+          <a:prstGeom prst="rect">
+            <a:avLst/>
+          </a:prstGeom>
+          <a:noFill/>
+          <a:extLst>
+            <a:ext uri="{909E8E84-426E-40DD-AFC4-6F175D3DCCD1}">
+              <a14:hiddenFill xmlns:a14="http://schemas.microsoft.com/office/drawing/2010/main">
+                <a:solidFill>
+                  <a:srgbClr val="FFFFFF"/>
+                </a:solidFill>
+              </a14:hiddenFill>
+            </a:ext>
+          </a:extLst>
+        </p:spPr>
+      </p:pic>
+      <p:cxnSp>
+        <p:nvCxnSpPr>
+          <p:cNvPr id="10" name="Straight Arrow Connector 9">
+            <a:extLst>
+              <a:ext uri="{FF2B5EF4-FFF2-40B4-BE49-F238E27FC236}">
+                <a16:creationId xmlns:a16="http://schemas.microsoft.com/office/drawing/2014/main" id="{6A1BB636-D0EB-4DC9-AC1D-B20A492CC9CE}"/>
+              </a:ext>
+            </a:extLst>
+          </p:cNvPr>
+          <p:cNvCxnSpPr/>
+          <p:nvPr/>
+        </p:nvCxnSpPr>
+        <p:spPr>
+          <a:xfrm flipV="1">
+            <a:off x="7122253" y="1846439"/>
+            <a:ext cx="0" cy="1585520"/>
+          </a:xfrm>
+          <a:prstGeom prst="straightConnector1">
+            <a:avLst/>
+          </a:prstGeom>
+          <a:ln>
+            <a:tailEnd type="triangle"/>
+          </a:ln>
+        </p:spPr>
+        <p:style>
+          <a:lnRef idx="1">
+            <a:schemeClr val="accent1"/>
+          </a:lnRef>
+          <a:fillRef idx="0">
+            <a:schemeClr val="accent1"/>
+          </a:fillRef>
+          <a:effectRef idx="0">
+            <a:schemeClr val="accent1"/>
+          </a:effectRef>
+          <a:fontRef idx="minor">
+            <a:schemeClr val="tx1"/>
+          </a:fontRef>
+        </p:style>
+      </p:cxnSp>
+      <p:cxnSp>
+        <p:nvCxnSpPr>
+          <p:cNvPr id="16" name="Straight Arrow Connector 15">
+            <a:extLst>
+              <a:ext uri="{FF2B5EF4-FFF2-40B4-BE49-F238E27FC236}">
+                <a16:creationId xmlns:a16="http://schemas.microsoft.com/office/drawing/2014/main" id="{3C961884-2BBD-43E5-9A20-CE6962E093EA}"/>
+              </a:ext>
+            </a:extLst>
+          </p:cNvPr>
+          <p:cNvCxnSpPr>
+            <a:cxnSpLocks/>
+          </p:cNvCxnSpPr>
+          <p:nvPr/>
+        </p:nvCxnSpPr>
+        <p:spPr>
+          <a:xfrm>
+            <a:off x="10002806" y="5514573"/>
+            <a:ext cx="1870745" cy="1"/>
+          </a:xfrm>
+          <a:prstGeom prst="straightConnector1">
+            <a:avLst/>
+          </a:prstGeom>
+          <a:ln>
+            <a:tailEnd type="triangle"/>
+          </a:ln>
+        </p:spPr>
+        <p:style>
+          <a:lnRef idx="1">
+            <a:schemeClr val="accent1"/>
+          </a:lnRef>
+          <a:fillRef idx="0">
+            <a:schemeClr val="accent1"/>
+          </a:fillRef>
+          <a:effectRef idx="0">
+            <a:schemeClr val="accent1"/>
+          </a:effectRef>
+          <a:fontRef idx="minor">
+            <a:schemeClr val="tx1"/>
+          </a:fontRef>
+        </p:style>
+      </p:cxnSp>
+      <p:sp>
+        <p:nvSpPr>
+          <p:cNvPr id="15" name="TextBox 14">
+            <a:extLst>
+              <a:ext uri="{FF2B5EF4-FFF2-40B4-BE49-F238E27FC236}">
+                <a16:creationId xmlns:a16="http://schemas.microsoft.com/office/drawing/2014/main" id="{0F4B26C8-0678-4B66-A825-4EA410C2B6E2}"/>
+              </a:ext>
+            </a:extLst>
+          </p:cNvPr>
+          <p:cNvSpPr txBox="1"/>
+          <p:nvPr/>
+        </p:nvSpPr>
+        <p:spPr>
+          <a:xfrm>
+            <a:off x="4497355" y="5687164"/>
+            <a:ext cx="5855449" cy="369332"/>
+          </a:xfrm>
+          <a:prstGeom prst="rect">
+            <a:avLst/>
+          </a:prstGeom>
+          <a:noFill/>
+        </p:spPr>
+        <p:txBody>
+          <a:bodyPr wrap="none" rtlCol="0">
+            <a:spAutoFit/>
+          </a:bodyPr>
+          <a:lstStyle/>
+          <a:p>
+            <a:r>
+              <a:rPr lang="en-US" dirty="0">
+                <a:hlinkClick r:id="rId6"/>
+              </a:rPr>
+              <a:t>https://www.scribbr.com/statistics/simple-linear-regression/</a:t>
+            </a:r>
+            <a:endParaRPr lang="en-US" dirty="0"/>
+          </a:p>
+        </p:txBody>
+      </p:sp>
     </p:spTree>
     <p:extLst>
       <p:ext uri="{BB962C8B-B14F-4D97-AF65-F5344CB8AC3E}">
@@ -7106,213 +8632,369 @@
   <p:clrMapOvr>
     <a:masterClrMapping/>
   </p:clrMapOvr>
-</p:sld>
-</file>
-
-<file path=ppt/slides/slide18.xml><?xml version="1.0" encoding="utf-8"?>
-<p:sld xmlns:a="http://schemas.openxmlformats.org/drawingml/2006/main" xmlns:r="http://schemas.openxmlformats.org/officeDocument/2006/relationships" xmlns:p="http://schemas.openxmlformats.org/presentationml/2006/main">
-  <p:cSld>
-    <p:spTree>
-      <p:nvGrpSpPr>
-        <p:cNvPr id="1" name=""/>
-        <p:cNvGrpSpPr/>
-        <p:nvPr/>
-      </p:nvGrpSpPr>
-      <p:grpSpPr>
-        <a:xfrm>
-          <a:off x="0" y="0"/>
-          <a:ext cx="0" cy="0"/>
-          <a:chOff x="0" y="0"/>
-          <a:chExt cx="0" cy="0"/>
-        </a:xfrm>
-      </p:grpSpPr>
-      <p:sp>
-        <p:nvSpPr>
-          <p:cNvPr id="2" name="Title 1"/>
-          <p:cNvSpPr>
-            <a:spLocks noGrp="1"/>
-          </p:cNvSpPr>
-          <p:nvPr>
-            <p:ph type="title"/>
-          </p:nvPr>
-        </p:nvSpPr>
-        <p:spPr/>
-        <p:txBody>
-          <a:bodyPr/>
-          <a:lstStyle/>
-          <a:p>
-            <a:r>
-              <a:rPr lang="en-US" dirty="0"/>
-              <a:t>Regression Example</a:t>
-            </a:r>
-          </a:p>
-        </p:txBody>
-      </p:sp>
-      <p:sp>
-        <p:nvSpPr>
-          <p:cNvPr id="3" name="Content Placeholder 2"/>
-          <p:cNvSpPr>
-            <a:spLocks noGrp="1"/>
-          </p:cNvSpPr>
-          <p:nvPr>
-            <p:ph idx="1"/>
-          </p:nvPr>
-        </p:nvSpPr>
-        <p:spPr>
-          <a:xfrm>
-            <a:off x="5439266" y="1539277"/>
-            <a:ext cx="5716413" cy="4329817"/>
-          </a:xfrm>
-        </p:spPr>
-        <p:txBody>
-          <a:bodyPr/>
-          <a:lstStyle/>
-          <a:p>
-            <a:r>
-              <a:rPr lang="en-US" dirty="0"/>
-              <a:t>Predict blood glucose level </a:t>
-            </a:r>
-          </a:p>
-          <a:p>
-            <a:r>
-              <a:rPr lang="en-US" dirty="0"/>
-              <a:t>Many possible predictors:</a:t>
-            </a:r>
-          </a:p>
-          <a:p>
-            <a:pPr lvl="1"/>
-            <a:r>
-              <a:rPr lang="en-US" dirty="0"/>
-              <a:t>Recent past levels</a:t>
-            </a:r>
-          </a:p>
-          <a:p>
-            <a:pPr lvl="1"/>
-            <a:r>
-              <a:rPr lang="en-US" dirty="0"/>
-              <a:t>Insulin dose</a:t>
-            </a:r>
-          </a:p>
-          <a:p>
-            <a:pPr lvl="1"/>
-            <a:r>
-              <a:rPr lang="en-US" dirty="0"/>
-              <a:t>Time of last meal</a:t>
-            </a:r>
-          </a:p>
-          <a:p>
-            <a:pPr lvl="1"/>
-            <a:r>
-              <a:rPr lang="en-US" dirty="0"/>
-              <a:t>…</a:t>
-            </a:r>
-          </a:p>
-          <a:p>
-            <a:pPr lvl="1"/>
-            <a:endParaRPr lang="en-US" dirty="0"/>
-          </a:p>
-          <a:p>
-            <a:r>
-              <a:rPr lang="en-US" dirty="0"/>
-              <a:t>Check out data in: </a:t>
-            </a:r>
-            <a:br>
-              <a:rPr lang="en-US" dirty="0"/>
-            </a:br>
-            <a:r>
-              <a:rPr lang="en-US" dirty="0">
-                <a:hlinkClick r:id="rId2"/>
-              </a:rPr>
-              <a:t>https://archive.ics.uci.edu/ml/datasets/Diabetes</a:t>
-            </a:r>
-            <a:br>
-              <a:rPr lang="en-US" dirty="0"/>
-            </a:br>
-            <a:endParaRPr lang="en-US" dirty="0"/>
-          </a:p>
-        </p:txBody>
-      </p:sp>
-      <p:sp>
-        <p:nvSpPr>
-          <p:cNvPr id="4" name="Slide Number Placeholder 3"/>
-          <p:cNvSpPr>
-            <a:spLocks noGrp="1"/>
-          </p:cNvSpPr>
-          <p:nvPr>
-            <p:ph type="sldNum" sz="quarter" idx="12"/>
-          </p:nvPr>
-        </p:nvSpPr>
-        <p:spPr/>
-        <p:txBody>
-          <a:bodyPr/>
-          <a:lstStyle/>
-          <a:p>
-            <a:fld id="{629637A9-119A-49DA-BD12-AAC58B377D80}" type="slidenum">
-              <a:rPr lang="en-US" smtClean="0"/>
-              <a:t>18</a:t>
-            </a:fld>
-            <a:endParaRPr lang="en-US" dirty="0"/>
-          </a:p>
-        </p:txBody>
-      </p:sp>
-      <p:pic>
-        <p:nvPicPr>
-          <p:cNvPr id="5" name="Picture 4"/>
-          <p:cNvPicPr>
-            <a:picLocks noChangeAspect="1"/>
-          </p:cNvPicPr>
-          <p:nvPr/>
-        </p:nvPicPr>
-        <p:blipFill>
-          <a:blip r:embed="rId3"/>
-          <a:stretch>
-            <a:fillRect/>
-          </a:stretch>
-        </p:blipFill>
-        <p:spPr>
-          <a:xfrm>
-            <a:off x="919702" y="1621312"/>
-            <a:ext cx="3848100" cy="1390650"/>
-          </a:xfrm>
-          <a:prstGeom prst="rect">
-            <a:avLst/>
-          </a:prstGeom>
-        </p:spPr>
-      </p:pic>
-      <p:pic>
-        <p:nvPicPr>
-          <p:cNvPr id="6" name="Picture 5"/>
-          <p:cNvPicPr>
-            <a:picLocks noChangeAspect="1"/>
-          </p:cNvPicPr>
-          <p:nvPr/>
-        </p:nvPicPr>
-        <p:blipFill>
-          <a:blip r:embed="rId4"/>
-          <a:stretch>
-            <a:fillRect/>
-          </a:stretch>
-        </p:blipFill>
-        <p:spPr>
-          <a:xfrm>
-            <a:off x="919702" y="3011962"/>
-            <a:ext cx="2337380" cy="3266241"/>
-          </a:xfrm>
-          <a:prstGeom prst="rect">
-            <a:avLst/>
-          </a:prstGeom>
-        </p:spPr>
-      </p:pic>
-    </p:spTree>
-    <p:extLst>
-      <p:ext uri="{BB962C8B-B14F-4D97-AF65-F5344CB8AC3E}">
-        <p14:creationId xmlns:p14="http://schemas.microsoft.com/office/powerpoint/2010/main" val="1766443914"/>
-      </p:ext>
-    </p:extLst>
-  </p:cSld>
-  <p:clrMapOvr>
-    <a:masterClrMapping/>
-  </p:clrMapOvr>
+  <p:timing>
+    <p:tnLst>
+      <p:par>
+        <p:cTn id="1" dur="indefinite" restart="never" nodeType="tmRoot">
+          <p:childTnLst>
+            <p:seq concurrent="1" nextAc="seek">
+              <p:cTn id="2" dur="indefinite" nodeType="mainSeq">
+                <p:childTnLst>
+                  <p:par>
+                    <p:cTn id="3" fill="hold">
+                      <p:stCondLst>
+                        <p:cond delay="indefinite"/>
+                      </p:stCondLst>
+                      <p:childTnLst>
+                        <p:par>
+                          <p:cTn id="4" fill="hold">
+                            <p:stCondLst>
+                              <p:cond delay="0"/>
+                            </p:stCondLst>
+                            <p:childTnLst>
+                              <p:par>
+                                <p:cTn id="5" presetID="1" presetClass="entr" presetSubtype="0" fill="hold" nodeType="clickEffect">
+                                  <p:stCondLst>
+                                    <p:cond delay="0"/>
+                                  </p:stCondLst>
+                                  <p:childTnLst>
+                                    <p:set>
+                                      <p:cBhvr>
+                                        <p:cTn id="6" dur="1" fill="hold">
+                                          <p:stCondLst>
+                                            <p:cond delay="0"/>
+                                          </p:stCondLst>
+                                        </p:cTn>
+                                        <p:tgtEl>
+                                          <p:spTgt spid="3">
+                                            <p:txEl>
+                                              <p:pRg st="0" end="0"/>
+                                            </p:txEl>
+                                          </p:spTgt>
+                                        </p:tgtEl>
+                                        <p:attrNameLst>
+                                          <p:attrName>style.visibility</p:attrName>
+                                        </p:attrNameLst>
+                                      </p:cBhvr>
+                                      <p:to>
+                                        <p:strVal val="visible"/>
+                                      </p:to>
+                                    </p:set>
+                                  </p:childTnLst>
+                                </p:cTn>
+                              </p:par>
+                              <p:par>
+                                <p:cTn id="7" presetID="1" presetClass="entr" presetSubtype="0" fill="hold" nodeType="withEffect">
+                                  <p:stCondLst>
+                                    <p:cond delay="0"/>
+                                  </p:stCondLst>
+                                  <p:childTnLst>
+                                    <p:set>
+                                      <p:cBhvr>
+                                        <p:cTn id="8" dur="1" fill="hold">
+                                          <p:stCondLst>
+                                            <p:cond delay="0"/>
+                                          </p:stCondLst>
+                                        </p:cTn>
+                                        <p:tgtEl>
+                                          <p:spTgt spid="3">
+                                            <p:txEl>
+                                              <p:pRg st="1" end="1"/>
+                                            </p:txEl>
+                                          </p:spTgt>
+                                        </p:tgtEl>
+                                        <p:attrNameLst>
+                                          <p:attrName>style.visibility</p:attrName>
+                                        </p:attrNameLst>
+                                      </p:cBhvr>
+                                      <p:to>
+                                        <p:strVal val="visible"/>
+                                      </p:to>
+                                    </p:set>
+                                  </p:childTnLst>
+                                </p:cTn>
+                              </p:par>
+                            </p:childTnLst>
+                          </p:cTn>
+                        </p:par>
+                      </p:childTnLst>
+                    </p:cTn>
+                  </p:par>
+                  <p:par>
+                    <p:cTn id="9" fill="hold">
+                      <p:stCondLst>
+                        <p:cond delay="indefinite"/>
+                      </p:stCondLst>
+                      <p:childTnLst>
+                        <p:par>
+                          <p:cTn id="10" fill="hold">
+                            <p:stCondLst>
+                              <p:cond delay="0"/>
+                            </p:stCondLst>
+                            <p:childTnLst>
+                              <p:par>
+                                <p:cTn id="11" presetID="1" presetClass="entr" presetSubtype="0" fill="hold" nodeType="clickEffect">
+                                  <p:stCondLst>
+                                    <p:cond delay="0"/>
+                                  </p:stCondLst>
+                                  <p:childTnLst>
+                                    <p:set>
+                                      <p:cBhvr>
+                                        <p:cTn id="12" dur="1" fill="hold">
+                                          <p:stCondLst>
+                                            <p:cond delay="0"/>
+                                          </p:stCondLst>
+                                        </p:cTn>
+                                        <p:tgtEl>
+                                          <p:spTgt spid="3">
+                                            <p:txEl>
+                                              <p:pRg st="2" end="2"/>
+                                            </p:txEl>
+                                          </p:spTgt>
+                                        </p:tgtEl>
+                                        <p:attrNameLst>
+                                          <p:attrName>style.visibility</p:attrName>
+                                        </p:attrNameLst>
+                                      </p:cBhvr>
+                                      <p:to>
+                                        <p:strVal val="visible"/>
+                                      </p:to>
+                                    </p:set>
+                                  </p:childTnLst>
+                                </p:cTn>
+                              </p:par>
+                              <p:par>
+                                <p:cTn id="13" presetID="1" presetClass="entr" presetSubtype="0" fill="hold" nodeType="withEffect">
+                                  <p:stCondLst>
+                                    <p:cond delay="0"/>
+                                  </p:stCondLst>
+                                  <p:childTnLst>
+                                    <p:set>
+                                      <p:cBhvr>
+                                        <p:cTn id="14" dur="1" fill="hold">
+                                          <p:stCondLst>
+                                            <p:cond delay="0"/>
+                                          </p:stCondLst>
+                                        </p:cTn>
+                                        <p:tgtEl>
+                                          <p:spTgt spid="3">
+                                            <p:txEl>
+                                              <p:pRg st="3" end="3"/>
+                                            </p:txEl>
+                                          </p:spTgt>
+                                        </p:tgtEl>
+                                        <p:attrNameLst>
+                                          <p:attrName>style.visibility</p:attrName>
+                                        </p:attrNameLst>
+                                      </p:cBhvr>
+                                      <p:to>
+                                        <p:strVal val="visible"/>
+                                      </p:to>
+                                    </p:set>
+                                  </p:childTnLst>
+                                </p:cTn>
+                              </p:par>
+                              <p:par>
+                                <p:cTn id="15" presetID="1" presetClass="entr" presetSubtype="0" fill="hold" nodeType="withEffect">
+                                  <p:stCondLst>
+                                    <p:cond delay="0"/>
+                                  </p:stCondLst>
+                                  <p:childTnLst>
+                                    <p:set>
+                                      <p:cBhvr>
+                                        <p:cTn id="16" dur="1" fill="hold">
+                                          <p:stCondLst>
+                                            <p:cond delay="0"/>
+                                          </p:stCondLst>
+                                        </p:cTn>
+                                        <p:tgtEl>
+                                          <p:spTgt spid="3">
+                                            <p:txEl>
+                                              <p:pRg st="4" end="4"/>
+                                            </p:txEl>
+                                          </p:spTgt>
+                                        </p:tgtEl>
+                                        <p:attrNameLst>
+                                          <p:attrName>style.visibility</p:attrName>
+                                        </p:attrNameLst>
+                                      </p:cBhvr>
+                                      <p:to>
+                                        <p:strVal val="visible"/>
+                                      </p:to>
+                                    </p:set>
+                                  </p:childTnLst>
+                                </p:cTn>
+                              </p:par>
+                              <p:par>
+                                <p:cTn id="17" presetID="1" presetClass="entr" presetSubtype="0" fill="hold" nodeType="withEffect">
+                                  <p:stCondLst>
+                                    <p:cond delay="0"/>
+                                  </p:stCondLst>
+                                  <p:childTnLst>
+                                    <p:set>
+                                      <p:cBhvr>
+                                        <p:cTn id="18" dur="1" fill="hold">
+                                          <p:stCondLst>
+                                            <p:cond delay="0"/>
+                                          </p:stCondLst>
+                                        </p:cTn>
+                                        <p:tgtEl>
+                                          <p:spTgt spid="3">
+                                            <p:txEl>
+                                              <p:pRg st="5" end="5"/>
+                                            </p:txEl>
+                                          </p:spTgt>
+                                        </p:tgtEl>
+                                        <p:attrNameLst>
+                                          <p:attrName>style.visibility</p:attrName>
+                                        </p:attrNameLst>
+                                      </p:cBhvr>
+                                      <p:to>
+                                        <p:strVal val="visible"/>
+                                      </p:to>
+                                    </p:set>
+                                  </p:childTnLst>
+                                </p:cTn>
+                              </p:par>
+                            </p:childTnLst>
+                          </p:cTn>
+                        </p:par>
+                      </p:childTnLst>
+                    </p:cTn>
+                  </p:par>
+                  <p:par>
+                    <p:cTn id="19" fill="hold">
+                      <p:stCondLst>
+                        <p:cond delay="indefinite"/>
+                      </p:stCondLst>
+                      <p:childTnLst>
+                        <p:par>
+                          <p:cTn id="20" fill="hold">
+                            <p:stCondLst>
+                              <p:cond delay="0"/>
+                            </p:stCondLst>
+                            <p:childTnLst>
+                              <p:par>
+                                <p:cTn id="21" presetID="1" presetClass="entr" presetSubtype="0" fill="hold" nodeType="clickEffect">
+                                  <p:stCondLst>
+                                    <p:cond delay="0"/>
+                                  </p:stCondLst>
+                                  <p:childTnLst>
+                                    <p:set>
+                                      <p:cBhvr>
+                                        <p:cTn id="22" dur="1" fill="hold">
+                                          <p:stCondLst>
+                                            <p:cond delay="0"/>
+                                          </p:stCondLst>
+                                        </p:cTn>
+                                        <p:tgtEl>
+                                          <p:spTgt spid="3">
+                                            <p:txEl>
+                                              <p:pRg st="6" end="6"/>
+                                            </p:txEl>
+                                          </p:spTgt>
+                                        </p:tgtEl>
+                                        <p:attrNameLst>
+                                          <p:attrName>style.visibility</p:attrName>
+                                        </p:attrNameLst>
+                                      </p:cBhvr>
+                                      <p:to>
+                                        <p:strVal val="visible"/>
+                                      </p:to>
+                                    </p:set>
+                                  </p:childTnLst>
+                                </p:cTn>
+                              </p:par>
+                              <p:par>
+                                <p:cTn id="23" presetID="1" presetClass="entr" presetSubtype="0" fill="hold" nodeType="withEffect">
+                                  <p:stCondLst>
+                                    <p:cond delay="0"/>
+                                  </p:stCondLst>
+                                  <p:childTnLst>
+                                    <p:set>
+                                      <p:cBhvr>
+                                        <p:cTn id="24" dur="1" fill="hold">
+                                          <p:stCondLst>
+                                            <p:cond delay="0"/>
+                                          </p:stCondLst>
+                                        </p:cTn>
+                                        <p:tgtEl>
+                                          <p:spTgt spid="3">
+                                            <p:txEl>
+                                              <p:pRg st="7" end="7"/>
+                                            </p:txEl>
+                                          </p:spTgt>
+                                        </p:tgtEl>
+                                        <p:attrNameLst>
+                                          <p:attrName>style.visibility</p:attrName>
+                                        </p:attrNameLst>
+                                      </p:cBhvr>
+                                      <p:to>
+                                        <p:strVal val="visible"/>
+                                      </p:to>
+                                    </p:set>
+                                  </p:childTnLst>
+                                </p:cTn>
+                              </p:par>
+                              <p:par>
+                                <p:cTn id="25" presetID="1" presetClass="entr" presetSubtype="0" fill="hold" nodeType="withEffect">
+                                  <p:stCondLst>
+                                    <p:cond delay="0"/>
+                                  </p:stCondLst>
+                                  <p:childTnLst>
+                                    <p:set>
+                                      <p:cBhvr>
+                                        <p:cTn id="26" dur="1" fill="hold">
+                                          <p:stCondLst>
+                                            <p:cond delay="0"/>
+                                          </p:stCondLst>
+                                        </p:cTn>
+                                        <p:tgtEl>
+                                          <p:spTgt spid="3">
+                                            <p:txEl>
+                                              <p:pRg st="8" end="8"/>
+                                            </p:txEl>
+                                          </p:spTgt>
+                                        </p:tgtEl>
+                                        <p:attrNameLst>
+                                          <p:attrName>style.visibility</p:attrName>
+                                        </p:attrNameLst>
+                                      </p:cBhvr>
+                                      <p:to>
+                                        <p:strVal val="visible"/>
+                                      </p:to>
+                                    </p:set>
+                                  </p:childTnLst>
+                                </p:cTn>
+                              </p:par>
+                            </p:childTnLst>
+                          </p:cTn>
+                        </p:par>
+                      </p:childTnLst>
+                    </p:cTn>
+                  </p:par>
+                </p:childTnLst>
+              </p:cTn>
+              <p:prevCondLst>
+                <p:cond evt="onPrev" delay="0">
+                  <p:tgtEl>
+                    <p:sldTgt/>
+                  </p:tgtEl>
+                </p:cond>
+              </p:prevCondLst>
+              <p:nextCondLst>
+                <p:cond evt="onNext" delay="0">
+                  <p:tgtEl>
+                    <p:sldTgt/>
+                  </p:tgtEl>
+                </p:cond>
+              </p:nextCondLst>
+            </p:seq>
+          </p:childTnLst>
+        </p:cTn>
+      </p:par>
+    </p:tnLst>
+  </p:timing>
 </p:sld>
 </file>
 
@@ -7355,70 +9037,139 @@
           </a:p>
         </p:txBody>
       </p:sp>
-      <p:sp>
-        <p:nvSpPr>
-          <p:cNvPr id="3" name="Content Placeholder 2"/>
-          <p:cNvSpPr>
-            <a:spLocks noGrp="1"/>
-          </p:cNvSpPr>
-          <p:nvPr>
-            <p:ph idx="1"/>
-          </p:nvPr>
-        </p:nvSpPr>
-        <p:spPr/>
-        <p:txBody>
-          <a:bodyPr/>
-          <a:lstStyle/>
-          <a:p>
-            <a:r>
-              <a:rPr lang="en-US" dirty="0"/>
-              <a:t>Learning “what normally happens”</a:t>
-            </a:r>
-          </a:p>
-          <a:p>
-            <a:r>
-              <a:rPr lang="en-US" dirty="0"/>
-              <a:t>No output</a:t>
-            </a:r>
-          </a:p>
-          <a:p>
-            <a:r>
-              <a:rPr lang="en-US" dirty="0"/>
-              <a:t>Clustering: Grouping similar instances</a:t>
-            </a:r>
-          </a:p>
-          <a:p>
-            <a:r>
-              <a:rPr lang="en-US" dirty="0"/>
-              <a:t>Example applications</a:t>
-            </a:r>
-          </a:p>
-          <a:p>
-            <a:pPr lvl="1"/>
-            <a:r>
-              <a:rPr lang="en-US" dirty="0"/>
-              <a:t>Customer segmentation </a:t>
-            </a:r>
-          </a:p>
-          <a:p>
-            <a:pPr lvl="1"/>
-            <a:r>
-              <a:rPr lang="en-US" dirty="0"/>
-              <a:t>Image compression: Color quantization</a:t>
-            </a:r>
-          </a:p>
-          <a:p>
-            <a:pPr lvl="1"/>
-            <a:r>
-              <a:rPr lang="en-US" dirty="0"/>
-              <a:t>Bioinformatics: Learning motifs</a:t>
-            </a:r>
-          </a:p>
-          <a:p>
-            <a:endParaRPr lang="en-US" dirty="0"/>
-          </a:p>
-        </p:txBody>
-      </p:sp>
+      <mc:AlternateContent xmlns:mc="http://schemas.openxmlformats.org/markup-compatibility/2006">
+        <mc:Choice xmlns:a14="http://schemas.microsoft.com/office/drawing/2010/main" Requires="a14">
+          <p:sp>
+            <p:nvSpPr>
+              <p:cNvPr id="3" name="Content Placeholder 2"/>
+              <p:cNvSpPr>
+                <a:spLocks noGrp="1"/>
+              </p:cNvSpPr>
+              <p:nvPr>
+                <p:ph idx="1"/>
+              </p:nvPr>
+            </p:nvSpPr>
+            <p:spPr/>
+            <p:txBody>
+              <a:bodyPr/>
+              <a:lstStyle/>
+              <a:p>
+                <a:r>
+                  <a:rPr lang="en-US" dirty="0"/>
+                  <a:t>Learning “what normally happens”</a:t>
+                </a:r>
+              </a:p>
+              <a:p>
+                <a:r>
+                  <a:rPr lang="en-US" dirty="0"/>
+                  <a:t>No output</a:t>
+                </a:r>
+              </a:p>
+              <a:p>
+                <a:pPr lvl="1"/>
+                <a:r>
+                  <a:rPr lang="en-US" dirty="0"/>
+                  <a:t>Just values </a:t>
+                </a:r>
+                <a14:m>
+                  <m:oMath xmlns:m="http://schemas.openxmlformats.org/officeDocument/2006/math">
+                    <m:r>
+                      <a:rPr lang="es-ES" b="1" i="1" smtClean="0">
+                        <a:latin typeface="Cambria Math" panose="02040503050406030204" pitchFamily="18" charset="0"/>
+                      </a:rPr>
+                      <m:t>𝒙</m:t>
+                    </m:r>
+                  </m:oMath>
+                </a14:m>
+                <a:r>
+                  <a:rPr lang="en-US" dirty="0"/>
+                  <a:t>.  No target </a:t>
+                </a:r>
+                <a14:m>
+                  <m:oMath xmlns:m="http://schemas.openxmlformats.org/officeDocument/2006/math">
+                    <m:r>
+                      <a:rPr lang="es-ES" b="0" i="1" smtClean="0">
+                        <a:latin typeface="Cambria Math" panose="02040503050406030204" pitchFamily="18" charset="0"/>
+                      </a:rPr>
+                      <m:t>𝑦</m:t>
+                    </m:r>
+                  </m:oMath>
+                </a14:m>
+                <a:endParaRPr lang="en-US" dirty="0"/>
+              </a:p>
+              <a:p>
+                <a:r>
+                  <a:rPr lang="en-US" dirty="0"/>
+                  <a:t>Clustering: Grouping similar instances</a:t>
+                </a:r>
+              </a:p>
+              <a:p>
+                <a:r>
+                  <a:rPr lang="en-US" dirty="0"/>
+                  <a:t>Example applications</a:t>
+                </a:r>
+              </a:p>
+              <a:p>
+                <a:pPr lvl="1"/>
+                <a:r>
+                  <a:rPr lang="en-US" dirty="0"/>
+                  <a:t>Customer segmentation </a:t>
+                </a:r>
+              </a:p>
+              <a:p>
+                <a:pPr lvl="1"/>
+                <a:r>
+                  <a:rPr lang="en-US" dirty="0"/>
+                  <a:t>Image compression: Color quantization</a:t>
+                </a:r>
+              </a:p>
+              <a:p>
+                <a:pPr lvl="1"/>
+                <a:r>
+                  <a:rPr lang="en-US" dirty="0"/>
+                  <a:t>Bioinformatics: Learning motifs</a:t>
+                </a:r>
+              </a:p>
+              <a:p>
+                <a:endParaRPr lang="en-US" dirty="0"/>
+              </a:p>
+            </p:txBody>
+          </p:sp>
+        </mc:Choice>
+        <mc:Fallback>
+          <p:sp>
+            <p:nvSpPr>
+              <p:cNvPr id="3" name="Content Placeholder 2"/>
+              <p:cNvSpPr>
+                <a:spLocks noGrp="1" noRot="1" noChangeAspect="1" noMove="1" noResize="1" noEditPoints="1" noAdjustHandles="1" noChangeArrowheads="1" noChangeShapeType="1" noTextEdit="1"/>
+              </p:cNvSpPr>
+              <p:nvPr>
+                <p:ph idx="1"/>
+              </p:nvPr>
+            </p:nvSpPr>
+            <p:spPr>
+              <a:blipFill>
+                <a:blip r:embed="rId2"/>
+                <a:stretch>
+                  <a:fillRect l="-1455" t="-1549"/>
+                </a:stretch>
+              </a:blipFill>
+            </p:spPr>
+            <p:txBody>
+              <a:bodyPr/>
+              <a:lstStyle/>
+              <a:p>
+                <a:r>
+                  <a:rPr lang="en-US">
+                    <a:noFill/>
+                  </a:rPr>
+                  <a:t> </a:t>
+                </a:r>
+              </a:p>
+            </p:txBody>
+          </p:sp>
+        </mc:Fallback>
+      </mc:AlternateContent>
       <p:sp>
         <p:nvSpPr>
           <p:cNvPr id="4" name="Slide Number Placeholder 3"/>
@@ -7451,7 +9202,7 @@
           <p:nvPr/>
         </p:nvPicPr>
         <p:blipFill>
-          <a:blip r:embed="rId2">
+          <a:blip r:embed="rId3">
             <a:extLst>
               <a:ext uri="{28A0092B-C50C-407E-A947-70E740481C1C}">
                 <a14:useLocalDpi xmlns:a14="http://schemas.microsoft.com/office/drawing/2010/main" val="0"/>
@@ -7513,7 +9264,7 @@
           <a:p>
             <a:r>
               <a:rPr lang="en-US" dirty="0">
-                <a:hlinkClick r:id="rId3"/>
+                <a:hlinkClick r:id="rId4"/>
               </a:rPr>
               <a:t>http://www.ibm.com/support/knowledgecenter</a:t>
             </a:r>
@@ -7544,6 +9295,227 @@
   <p:clrMapOvr>
     <a:masterClrMapping/>
   </p:clrMapOvr>
+  <p:timing>
+    <p:tnLst>
+      <p:par>
+        <p:cTn id="1" dur="indefinite" restart="never" nodeType="tmRoot">
+          <p:childTnLst>
+            <p:seq concurrent="1" nextAc="seek">
+              <p:cTn id="2" dur="indefinite" nodeType="mainSeq">
+                <p:childTnLst>
+                  <p:par>
+                    <p:cTn id="3" fill="hold">
+                      <p:stCondLst>
+                        <p:cond delay="indefinite"/>
+                      </p:stCondLst>
+                      <p:childTnLst>
+                        <p:par>
+                          <p:cTn id="4" fill="hold">
+                            <p:stCondLst>
+                              <p:cond delay="0"/>
+                            </p:stCondLst>
+                            <p:childTnLst>
+                              <p:par>
+                                <p:cTn id="5" presetID="1" presetClass="entr" presetSubtype="0" fill="hold" nodeType="clickEffect">
+                                  <p:stCondLst>
+                                    <p:cond delay="0"/>
+                                  </p:stCondLst>
+                                  <p:childTnLst>
+                                    <p:set>
+                                      <p:cBhvr>
+                                        <p:cTn id="6" dur="1" fill="hold">
+                                          <p:stCondLst>
+                                            <p:cond delay="0"/>
+                                          </p:stCondLst>
+                                        </p:cTn>
+                                        <p:tgtEl>
+                                          <p:spTgt spid="3">
+                                            <p:txEl>
+                                              <p:pRg st="3" end="3"/>
+                                            </p:txEl>
+                                          </p:spTgt>
+                                        </p:tgtEl>
+                                        <p:attrNameLst>
+                                          <p:attrName>style.visibility</p:attrName>
+                                        </p:attrNameLst>
+                                      </p:cBhvr>
+                                      <p:to>
+                                        <p:strVal val="visible"/>
+                                      </p:to>
+                                    </p:set>
+                                  </p:childTnLst>
+                                </p:cTn>
+                              </p:par>
+                            </p:childTnLst>
+                          </p:cTn>
+                        </p:par>
+                      </p:childTnLst>
+                    </p:cTn>
+                  </p:par>
+                  <p:par>
+                    <p:cTn id="7" fill="hold">
+                      <p:stCondLst>
+                        <p:cond delay="indefinite"/>
+                      </p:stCondLst>
+                      <p:childTnLst>
+                        <p:par>
+                          <p:cTn id="8" fill="hold">
+                            <p:stCondLst>
+                              <p:cond delay="0"/>
+                            </p:stCondLst>
+                            <p:childTnLst>
+                              <p:par>
+                                <p:cTn id="9" presetID="1" presetClass="entr" presetSubtype="0" fill="hold" nodeType="clickEffect">
+                                  <p:stCondLst>
+                                    <p:cond delay="0"/>
+                                  </p:stCondLst>
+                                  <p:childTnLst>
+                                    <p:set>
+                                      <p:cBhvr>
+                                        <p:cTn id="10" dur="1" fill="hold">
+                                          <p:stCondLst>
+                                            <p:cond delay="0"/>
+                                          </p:stCondLst>
+                                        </p:cTn>
+                                        <p:tgtEl>
+                                          <p:spTgt spid="3">
+                                            <p:txEl>
+                                              <p:pRg st="4" end="4"/>
+                                            </p:txEl>
+                                          </p:spTgt>
+                                        </p:tgtEl>
+                                        <p:attrNameLst>
+                                          <p:attrName>style.visibility</p:attrName>
+                                        </p:attrNameLst>
+                                      </p:cBhvr>
+                                      <p:to>
+                                        <p:strVal val="visible"/>
+                                      </p:to>
+                                    </p:set>
+                                  </p:childTnLst>
+                                </p:cTn>
+                              </p:par>
+                              <p:par>
+                                <p:cTn id="11" presetID="1" presetClass="entr" presetSubtype="0" fill="hold" nodeType="withEffect">
+                                  <p:stCondLst>
+                                    <p:cond delay="0"/>
+                                  </p:stCondLst>
+                                  <p:childTnLst>
+                                    <p:set>
+                                      <p:cBhvr>
+                                        <p:cTn id="12" dur="1" fill="hold">
+                                          <p:stCondLst>
+                                            <p:cond delay="0"/>
+                                          </p:stCondLst>
+                                        </p:cTn>
+                                        <p:tgtEl>
+                                          <p:spTgt spid="3">
+                                            <p:txEl>
+                                              <p:pRg st="5" end="5"/>
+                                            </p:txEl>
+                                          </p:spTgt>
+                                        </p:tgtEl>
+                                        <p:attrNameLst>
+                                          <p:attrName>style.visibility</p:attrName>
+                                        </p:attrNameLst>
+                                      </p:cBhvr>
+                                      <p:to>
+                                        <p:strVal val="visible"/>
+                                      </p:to>
+                                    </p:set>
+                                  </p:childTnLst>
+                                </p:cTn>
+                              </p:par>
+                              <p:par>
+                                <p:cTn id="13" presetID="1" presetClass="entr" presetSubtype="0" fill="hold" nodeType="withEffect">
+                                  <p:stCondLst>
+                                    <p:cond delay="0"/>
+                                  </p:stCondLst>
+                                  <p:childTnLst>
+                                    <p:set>
+                                      <p:cBhvr>
+                                        <p:cTn id="14" dur="1" fill="hold">
+                                          <p:stCondLst>
+                                            <p:cond delay="0"/>
+                                          </p:stCondLst>
+                                        </p:cTn>
+                                        <p:tgtEl>
+                                          <p:spTgt spid="3">
+                                            <p:txEl>
+                                              <p:pRg st="6" end="6"/>
+                                            </p:txEl>
+                                          </p:spTgt>
+                                        </p:tgtEl>
+                                        <p:attrNameLst>
+                                          <p:attrName>style.visibility</p:attrName>
+                                        </p:attrNameLst>
+                                      </p:cBhvr>
+                                      <p:to>
+                                        <p:strVal val="visible"/>
+                                      </p:to>
+                                    </p:set>
+                                  </p:childTnLst>
+                                </p:cTn>
+                              </p:par>
+                              <p:par>
+                                <p:cTn id="15" presetID="1" presetClass="entr" presetSubtype="0" fill="hold" nodeType="withEffect">
+                                  <p:stCondLst>
+                                    <p:cond delay="0"/>
+                                  </p:stCondLst>
+                                  <p:childTnLst>
+                                    <p:set>
+                                      <p:cBhvr>
+                                        <p:cTn id="16" dur="1" fill="hold">
+                                          <p:stCondLst>
+                                            <p:cond delay="0"/>
+                                          </p:stCondLst>
+                                        </p:cTn>
+                                        <p:tgtEl>
+                                          <p:spTgt spid="3">
+                                            <p:txEl>
+                                              <p:pRg st="7" end="7"/>
+                                            </p:txEl>
+                                          </p:spTgt>
+                                        </p:tgtEl>
+                                        <p:attrNameLst>
+                                          <p:attrName>style.visibility</p:attrName>
+                                        </p:attrNameLst>
+                                      </p:cBhvr>
+                                      <p:to>
+                                        <p:strVal val="visible"/>
+                                      </p:to>
+                                    </p:set>
+                                  </p:childTnLst>
+                                </p:cTn>
+                              </p:par>
+                            </p:childTnLst>
+                          </p:cTn>
+                        </p:par>
+                      </p:childTnLst>
+                    </p:cTn>
+                  </p:par>
+                </p:childTnLst>
+              </p:cTn>
+              <p:prevCondLst>
+                <p:cond evt="onPrev" delay="0">
+                  <p:tgtEl>
+                    <p:sldTgt/>
+                  </p:tgtEl>
+                </p:cond>
+              </p:prevCondLst>
+              <p:nextCondLst>
+                <p:cond evt="onNext" delay="0">
+                  <p:tgtEl>
+                    <p:sldTgt/>
+                  </p:tgtEl>
+                </p:cond>
+              </p:nextCondLst>
+            </p:seq>
+          </p:childTnLst>
+        </p:cTn>
+      </p:par>
+    </p:tnLst>
+  </p:timing>
 </p:sld>
 </file>
 
@@ -8174,6 +10146,1228 @@
       </p:grpSpPr>
       <p:sp>
         <p:nvSpPr>
+          <p:cNvPr id="2" name="Title 1">
+            <a:extLst>
+              <a:ext uri="{FF2B5EF4-FFF2-40B4-BE49-F238E27FC236}">
+                <a16:creationId xmlns:a16="http://schemas.microsoft.com/office/drawing/2014/main" id="{C117E4BA-10C2-4F55-BAB9-0C0B98975CD5}"/>
+              </a:ext>
+            </a:extLst>
+          </p:cNvPr>
+          <p:cNvSpPr>
+            <a:spLocks noGrp="1"/>
+          </p:cNvSpPr>
+          <p:nvPr>
+            <p:ph type="title"/>
+          </p:nvPr>
+        </p:nvSpPr>
+        <p:spPr/>
+        <p:txBody>
+          <a:bodyPr/>
+          <a:lstStyle/>
+          <a:p>
+            <a:r>
+              <a:rPr lang="en-US" dirty="0"/>
+              <a:t>Reinforcement Learning</a:t>
+            </a:r>
+          </a:p>
+        </p:txBody>
+      </p:sp>
+      <p:sp>
+        <p:nvSpPr>
+          <p:cNvPr id="3" name="Content Placeholder 2">
+            <a:extLst>
+              <a:ext uri="{FF2B5EF4-FFF2-40B4-BE49-F238E27FC236}">
+                <a16:creationId xmlns:a16="http://schemas.microsoft.com/office/drawing/2014/main" id="{EA07F277-3CE5-4809-B8A1-78E52A21B236}"/>
+              </a:ext>
+            </a:extLst>
+          </p:cNvPr>
+          <p:cNvSpPr>
+            <a:spLocks noGrp="1"/>
+          </p:cNvSpPr>
+          <p:nvPr>
+            <p:ph idx="1"/>
+          </p:nvPr>
+        </p:nvSpPr>
+        <p:spPr>
+          <a:xfrm>
+            <a:off x="811763" y="4031535"/>
+            <a:ext cx="10343917" cy="1837559"/>
+          </a:xfrm>
+        </p:spPr>
+        <p:txBody>
+          <a:bodyPr>
+            <a:normAutofit/>
+          </a:bodyPr>
+          <a:lstStyle/>
+          <a:p>
+            <a:r>
+              <a:rPr lang="en-US" dirty="0">
+                <a:solidFill>
+                  <a:schemeClr val="accent1">
+                    <a:lumMod val="60000"/>
+                    <a:lumOff val="40000"/>
+                  </a:schemeClr>
+                </a:solidFill>
+              </a:rPr>
+              <a:t>Agent</a:t>
+            </a:r>
+            <a:r>
+              <a:rPr lang="en-US" dirty="0"/>
+              <a:t> learns to make </a:t>
+            </a:r>
+            <a:r>
+              <a:rPr lang="en-US" dirty="0">
+                <a:solidFill>
+                  <a:schemeClr val="accent1">
+                    <a:lumMod val="60000"/>
+                    <a:lumOff val="40000"/>
+                  </a:schemeClr>
+                </a:solidFill>
+              </a:rPr>
+              <a:t>actions</a:t>
+            </a:r>
+            <a:r>
+              <a:rPr lang="en-US" dirty="0"/>
+              <a:t> that interact with an </a:t>
+            </a:r>
+            <a:r>
+              <a:rPr lang="en-US" dirty="0">
+                <a:solidFill>
+                  <a:schemeClr val="accent1">
+                    <a:lumMod val="60000"/>
+                    <a:lumOff val="40000"/>
+                  </a:schemeClr>
+                </a:solidFill>
+              </a:rPr>
+              <a:t>environment</a:t>
+            </a:r>
+            <a:r>
+              <a:rPr lang="en-US" dirty="0"/>
+              <a:t> to maximize a </a:t>
+            </a:r>
+            <a:r>
+              <a:rPr lang="en-US" dirty="0">
+                <a:solidFill>
+                  <a:schemeClr val="accent1">
+                    <a:lumMod val="60000"/>
+                    <a:lumOff val="40000"/>
+                  </a:schemeClr>
+                </a:solidFill>
+              </a:rPr>
+              <a:t>reward</a:t>
+            </a:r>
+          </a:p>
+          <a:p>
+            <a:pPr lvl="1"/>
+            <a:r>
+              <a:rPr lang="en-US" dirty="0"/>
+              <a:t>Agent typically acts in a </a:t>
+            </a:r>
+            <a:r>
+              <a:rPr lang="en-US" dirty="0">
+                <a:solidFill>
+                  <a:schemeClr val="accent1">
+                    <a:lumMod val="60000"/>
+                    <a:lumOff val="40000"/>
+                  </a:schemeClr>
+                </a:solidFill>
+              </a:rPr>
+              <a:t>closed loop system</a:t>
+            </a:r>
+          </a:p>
+          <a:p>
+            <a:r>
+              <a:rPr lang="en-US" dirty="0"/>
+              <a:t>Key tradeoffs:  </a:t>
+            </a:r>
+          </a:p>
+          <a:p>
+            <a:pPr lvl="1"/>
+            <a:r>
+              <a:rPr lang="en-US" dirty="0">
+                <a:solidFill>
+                  <a:schemeClr val="accent1">
+                    <a:lumMod val="60000"/>
+                    <a:lumOff val="40000"/>
+                  </a:schemeClr>
+                </a:solidFill>
+              </a:rPr>
+              <a:t>Exploitation</a:t>
+            </a:r>
+            <a:r>
+              <a:rPr lang="en-US" dirty="0"/>
+              <a:t> (Learn from past actions) vs.  </a:t>
+            </a:r>
+            <a:r>
+              <a:rPr lang="en-US" dirty="0">
+                <a:solidFill>
+                  <a:schemeClr val="accent1">
+                    <a:lumMod val="60000"/>
+                    <a:lumOff val="40000"/>
+                  </a:schemeClr>
+                </a:solidFill>
+              </a:rPr>
+              <a:t>exploration</a:t>
+            </a:r>
+            <a:r>
+              <a:rPr lang="en-US" dirty="0"/>
+              <a:t> (try new choices)</a:t>
+            </a:r>
+          </a:p>
+          <a:p>
+            <a:pPr lvl="1"/>
+            <a:r>
+              <a:rPr lang="en-US" dirty="0">
+                <a:solidFill>
+                  <a:schemeClr val="accent1">
+                    <a:lumMod val="60000"/>
+                    <a:lumOff val="40000"/>
+                  </a:schemeClr>
+                </a:solidFill>
+              </a:rPr>
+              <a:t>Credit assignment</a:t>
+            </a:r>
+            <a:r>
+              <a:rPr lang="en-US" dirty="0"/>
+              <a:t>:  Which actions in the past led to the current reward?</a:t>
+            </a:r>
+          </a:p>
+        </p:txBody>
+      </p:sp>
+      <p:sp>
+        <p:nvSpPr>
+          <p:cNvPr id="4" name="Slide Number Placeholder 3">
+            <a:extLst>
+              <a:ext uri="{FF2B5EF4-FFF2-40B4-BE49-F238E27FC236}">
+                <a16:creationId xmlns:a16="http://schemas.microsoft.com/office/drawing/2014/main" id="{DFCC176A-FF09-4FA2-B9E7-F45F743D4A2C}"/>
+              </a:ext>
+            </a:extLst>
+          </p:cNvPr>
+          <p:cNvSpPr>
+            <a:spLocks noGrp="1"/>
+          </p:cNvSpPr>
+          <p:nvPr>
+            <p:ph type="sldNum" sz="quarter" idx="12"/>
+          </p:nvPr>
+        </p:nvSpPr>
+        <p:spPr/>
+        <p:txBody>
+          <a:bodyPr/>
+          <a:lstStyle/>
+          <a:p>
+            <a:fld id="{629637A9-119A-49DA-BD12-AAC58B377D80}" type="slidenum">
+              <a:rPr lang="en-US" smtClean="0"/>
+              <a:t>20</a:t>
+            </a:fld>
+            <a:endParaRPr lang="en-US" dirty="0"/>
+          </a:p>
+        </p:txBody>
+      </p:sp>
+      <p:pic>
+        <p:nvPicPr>
+          <p:cNvPr id="3076" name="Picture 4" descr="Reinforcement Learning, Part 1: A Brief Introduction | by dan lee ...">
+            <a:extLst>
+              <a:ext uri="{FF2B5EF4-FFF2-40B4-BE49-F238E27FC236}">
+                <a16:creationId xmlns:a16="http://schemas.microsoft.com/office/drawing/2014/main" id="{E542B8C1-D858-490C-BE50-E4C0DA1AA97E}"/>
+              </a:ext>
+            </a:extLst>
+          </p:cNvPr>
+          <p:cNvPicPr>
+            <a:picLocks noChangeAspect="1" noChangeArrowheads="1"/>
+          </p:cNvPicPr>
+          <p:nvPr/>
+        </p:nvPicPr>
+        <p:blipFill>
+          <a:blip r:embed="rId2">
+            <a:extLst>
+              <a:ext uri="{28A0092B-C50C-407E-A947-70E740481C1C}">
+                <a14:useLocalDpi xmlns:a14="http://schemas.microsoft.com/office/drawing/2010/main" val="0"/>
+              </a:ext>
+            </a:extLst>
+          </a:blip>
+          <a:srcRect/>
+          <a:stretch>
+            <a:fillRect/>
+          </a:stretch>
+        </p:blipFill>
+        <p:spPr bwMode="auto">
+          <a:xfrm>
+            <a:off x="1501295" y="1567006"/>
+            <a:ext cx="4299234" cy="2464529"/>
+          </a:xfrm>
+          <a:prstGeom prst="rect">
+            <a:avLst/>
+          </a:prstGeom>
+          <a:noFill/>
+          <a:extLst>
+            <a:ext uri="{909E8E84-426E-40DD-AFC4-6F175D3DCCD1}">
+              <a14:hiddenFill xmlns:a14="http://schemas.microsoft.com/office/drawing/2010/main">
+                <a:solidFill>
+                  <a:srgbClr val="FFFFFF"/>
+                </a:solidFill>
+              </a14:hiddenFill>
+            </a:ext>
+          </a:extLst>
+        </p:spPr>
+      </p:pic>
+      <p:pic>
+        <p:nvPicPr>
+          <p:cNvPr id="3078" name="Picture 6" descr="Figure 2 from Giraffe: Using Deep Reinforcement Learning to Play ...">
+            <a:extLst>
+              <a:ext uri="{FF2B5EF4-FFF2-40B4-BE49-F238E27FC236}">
+                <a16:creationId xmlns:a16="http://schemas.microsoft.com/office/drawing/2014/main" id="{438848D0-3C30-4B26-BB8E-F72B7423F455}"/>
+              </a:ext>
+            </a:extLst>
+          </p:cNvPr>
+          <p:cNvPicPr>
+            <a:picLocks noChangeAspect="1" noChangeArrowheads="1"/>
+          </p:cNvPicPr>
+          <p:nvPr/>
+        </p:nvPicPr>
+        <p:blipFill>
+          <a:blip r:embed="rId3">
+            <a:extLst>
+              <a:ext uri="{28A0092B-C50C-407E-A947-70E740481C1C}">
+                <a14:useLocalDpi xmlns:a14="http://schemas.microsoft.com/office/drawing/2010/main" val="0"/>
+              </a:ext>
+            </a:extLst>
+          </a:blip>
+          <a:srcRect/>
+          <a:stretch>
+            <a:fillRect/>
+          </a:stretch>
+        </p:blipFill>
+        <p:spPr bwMode="auto">
+          <a:xfrm>
+            <a:off x="7744132" y="2024613"/>
+            <a:ext cx="1602662" cy="1685456"/>
+          </a:xfrm>
+          <a:prstGeom prst="rect">
+            <a:avLst/>
+          </a:prstGeom>
+          <a:noFill/>
+          <a:extLst>
+            <a:ext uri="{909E8E84-426E-40DD-AFC4-6F175D3DCCD1}">
+              <a14:hiddenFill xmlns:a14="http://schemas.microsoft.com/office/drawing/2010/main">
+                <a:solidFill>
+                  <a:srgbClr val="FFFFFF"/>
+                </a:solidFill>
+              </a14:hiddenFill>
+            </a:ext>
+          </a:extLst>
+        </p:spPr>
+      </p:pic>
+      <p:sp>
+        <p:nvSpPr>
+          <p:cNvPr id="5" name="TextBox 4">
+            <a:extLst>
+              <a:ext uri="{FF2B5EF4-FFF2-40B4-BE49-F238E27FC236}">
+                <a16:creationId xmlns:a16="http://schemas.microsoft.com/office/drawing/2014/main" id="{A61D4ABD-41D1-481A-B2CC-CB874FA7957D}"/>
+              </a:ext>
+            </a:extLst>
+          </p:cNvPr>
+          <p:cNvSpPr txBox="1"/>
+          <p:nvPr/>
+        </p:nvSpPr>
+        <p:spPr>
+          <a:xfrm>
+            <a:off x="5784611" y="1691595"/>
+            <a:ext cx="1410899" cy="369332"/>
+          </a:xfrm>
+          <a:prstGeom prst="rect">
+            <a:avLst/>
+          </a:prstGeom>
+          <a:noFill/>
+        </p:spPr>
+        <p:txBody>
+          <a:bodyPr wrap="none" rtlCol="0">
+            <a:spAutoFit/>
+          </a:bodyPr>
+          <a:lstStyle/>
+          <a:p>
+            <a:r>
+              <a:rPr lang="en-US" i="1" dirty="0"/>
+              <a:t>Move:  …Bd4</a:t>
+            </a:r>
+          </a:p>
+        </p:txBody>
+      </p:sp>
+      <p:cxnSp>
+        <p:nvCxnSpPr>
+          <p:cNvPr id="7" name="Straight Arrow Connector 6">
+            <a:extLst>
+              <a:ext uri="{FF2B5EF4-FFF2-40B4-BE49-F238E27FC236}">
+                <a16:creationId xmlns:a16="http://schemas.microsoft.com/office/drawing/2014/main" id="{7FD8C0F3-C28E-4455-A9DF-8FC4AC7F1F8C}"/>
+              </a:ext>
+            </a:extLst>
+          </p:cNvPr>
+          <p:cNvCxnSpPr/>
+          <p:nvPr/>
+        </p:nvCxnSpPr>
+        <p:spPr>
+          <a:xfrm>
+            <a:off x="5909912" y="2127452"/>
+            <a:ext cx="1376412" cy="0"/>
+          </a:xfrm>
+          <a:prstGeom prst="straightConnector1">
+            <a:avLst/>
+          </a:prstGeom>
+          <a:ln w="25400">
+            <a:tailEnd type="triangle"/>
+          </a:ln>
+        </p:spPr>
+        <p:style>
+          <a:lnRef idx="1">
+            <a:schemeClr val="accent1"/>
+          </a:lnRef>
+          <a:fillRef idx="0">
+            <a:schemeClr val="accent1"/>
+          </a:fillRef>
+          <a:effectRef idx="0">
+            <a:schemeClr val="accent1"/>
+          </a:effectRef>
+          <a:fontRef idx="minor">
+            <a:schemeClr val="tx1"/>
+          </a:fontRef>
+        </p:style>
+      </p:cxnSp>
+      <p:grpSp>
+        <p:nvGrpSpPr>
+          <p:cNvPr id="12" name="Group 11">
+            <a:extLst>
+              <a:ext uri="{FF2B5EF4-FFF2-40B4-BE49-F238E27FC236}">
+                <a16:creationId xmlns:a16="http://schemas.microsoft.com/office/drawing/2014/main" id="{D7C466F3-9E0D-4DD0-93ED-8B756D2E0EBE}"/>
+              </a:ext>
+            </a:extLst>
+          </p:cNvPr>
+          <p:cNvGrpSpPr/>
+          <p:nvPr/>
+        </p:nvGrpSpPr>
+        <p:grpSpPr>
+          <a:xfrm>
+            <a:off x="5418821" y="3284626"/>
+            <a:ext cx="2358594" cy="646331"/>
+            <a:chOff x="5418821" y="3284626"/>
+            <a:chExt cx="2358594" cy="646331"/>
+          </a:xfrm>
+        </p:grpSpPr>
+        <p:sp>
+          <p:nvSpPr>
+            <p:cNvPr id="9" name="TextBox 8">
+              <a:extLst>
+                <a:ext uri="{FF2B5EF4-FFF2-40B4-BE49-F238E27FC236}">
+                  <a16:creationId xmlns:a16="http://schemas.microsoft.com/office/drawing/2014/main" id="{BAD2AF1F-86ED-4BC7-8766-1D4D6C591A56}"/>
+                </a:ext>
+              </a:extLst>
+            </p:cNvPr>
+            <p:cNvSpPr txBox="1"/>
+            <p:nvPr/>
+          </p:nvSpPr>
+          <p:spPr>
+            <a:xfrm>
+              <a:off x="5418821" y="3284626"/>
+              <a:ext cx="2358594" cy="646331"/>
+            </a:xfrm>
+            <a:prstGeom prst="rect">
+              <a:avLst/>
+            </a:prstGeom>
+            <a:noFill/>
+          </p:spPr>
+          <p:txBody>
+            <a:bodyPr wrap="none" rtlCol="0">
+              <a:spAutoFit/>
+            </a:bodyPr>
+            <a:lstStyle/>
+            <a:p>
+              <a:r>
+                <a:rPr lang="en-US" dirty="0"/>
+                <a:t>State:  Current position</a:t>
+              </a:r>
+            </a:p>
+            <a:p>
+              <a:r>
+                <a:rPr lang="en-US" dirty="0"/>
+                <a:t>Reward:  Win or Lose</a:t>
+              </a:r>
+            </a:p>
+          </p:txBody>
+        </p:sp>
+        <p:cxnSp>
+          <p:nvCxnSpPr>
+            <p:cNvPr id="11" name="Straight Arrow Connector 10">
+              <a:extLst>
+                <a:ext uri="{FF2B5EF4-FFF2-40B4-BE49-F238E27FC236}">
+                  <a16:creationId xmlns:a16="http://schemas.microsoft.com/office/drawing/2014/main" id="{87594C27-1A32-475F-A39E-D691312B2E15}"/>
+                </a:ext>
+              </a:extLst>
+            </p:cNvPr>
+            <p:cNvCxnSpPr/>
+            <p:nvPr/>
+          </p:nvCxnSpPr>
+          <p:spPr>
+            <a:xfrm flipH="1">
+              <a:off x="5909912" y="3284626"/>
+              <a:ext cx="1376412" cy="0"/>
+            </a:xfrm>
+            <a:prstGeom prst="straightConnector1">
+              <a:avLst/>
+            </a:prstGeom>
+            <a:ln w="25400">
+              <a:tailEnd type="triangle"/>
+            </a:ln>
+          </p:spPr>
+          <p:style>
+            <a:lnRef idx="1">
+              <a:schemeClr val="accent1"/>
+            </a:lnRef>
+            <a:fillRef idx="0">
+              <a:schemeClr val="accent1"/>
+            </a:fillRef>
+            <a:effectRef idx="0">
+              <a:schemeClr val="accent1"/>
+            </a:effectRef>
+            <a:fontRef idx="minor">
+              <a:schemeClr val="tx1"/>
+            </a:fontRef>
+          </p:style>
+        </p:cxnSp>
+      </p:grpSp>
+    </p:spTree>
+    <p:extLst>
+      <p:ext uri="{BB962C8B-B14F-4D97-AF65-F5344CB8AC3E}">
+        <p14:creationId xmlns:p14="http://schemas.microsoft.com/office/powerpoint/2010/main" val="2037241363"/>
+      </p:ext>
+    </p:extLst>
+  </p:cSld>
+  <p:clrMapOvr>
+    <a:masterClrMapping/>
+  </p:clrMapOvr>
+  <p:timing>
+    <p:tnLst>
+      <p:par>
+        <p:cTn id="1" dur="indefinite" restart="never" nodeType="tmRoot">
+          <p:childTnLst>
+            <p:seq concurrent="1" nextAc="seek">
+              <p:cTn id="2" dur="indefinite" nodeType="mainSeq">
+                <p:childTnLst>
+                  <p:par>
+                    <p:cTn id="3" fill="hold">
+                      <p:stCondLst>
+                        <p:cond delay="indefinite"/>
+                        <p:cond evt="onBegin" delay="0">
+                          <p:tn val="2"/>
+                        </p:cond>
+                      </p:stCondLst>
+                      <p:childTnLst>
+                        <p:par>
+                          <p:cTn id="4" fill="hold">
+                            <p:stCondLst>
+                              <p:cond delay="0"/>
+                            </p:stCondLst>
+                            <p:childTnLst>
+                              <p:par>
+                                <p:cTn id="5" presetID="1" presetClass="entr" presetSubtype="0" fill="hold" nodeType="withEffect">
+                                  <p:stCondLst>
+                                    <p:cond delay="0"/>
+                                  </p:stCondLst>
+                                  <p:childTnLst>
+                                    <p:set>
+                                      <p:cBhvr>
+                                        <p:cTn id="6" dur="1" fill="hold">
+                                          <p:stCondLst>
+                                            <p:cond delay="0"/>
+                                          </p:stCondLst>
+                                        </p:cTn>
+                                        <p:tgtEl>
+                                          <p:spTgt spid="3">
+                                            <p:txEl>
+                                              <p:pRg st="0" end="0"/>
+                                            </p:txEl>
+                                          </p:spTgt>
+                                        </p:tgtEl>
+                                        <p:attrNameLst>
+                                          <p:attrName>style.visibility</p:attrName>
+                                        </p:attrNameLst>
+                                      </p:cBhvr>
+                                      <p:to>
+                                        <p:strVal val="visible"/>
+                                      </p:to>
+                                    </p:set>
+                                  </p:childTnLst>
+                                </p:cTn>
+                              </p:par>
+                            </p:childTnLst>
+                          </p:cTn>
+                        </p:par>
+                      </p:childTnLst>
+                    </p:cTn>
+                  </p:par>
+                  <p:par>
+                    <p:cTn id="7" fill="hold">
+                      <p:stCondLst>
+                        <p:cond delay="indefinite"/>
+                      </p:stCondLst>
+                      <p:childTnLst>
+                        <p:par>
+                          <p:cTn id="8" fill="hold">
+                            <p:stCondLst>
+                              <p:cond delay="0"/>
+                            </p:stCondLst>
+                            <p:childTnLst>
+                              <p:par>
+                                <p:cTn id="9" presetID="10" presetClass="entr" presetSubtype="0" fill="hold" nodeType="clickEffect">
+                                  <p:stCondLst>
+                                    <p:cond delay="0"/>
+                                  </p:stCondLst>
+                                  <p:childTnLst>
+                                    <p:set>
+                                      <p:cBhvr>
+                                        <p:cTn id="10" dur="1" fill="hold">
+                                          <p:stCondLst>
+                                            <p:cond delay="0"/>
+                                          </p:stCondLst>
+                                        </p:cTn>
+                                        <p:tgtEl>
+                                          <p:spTgt spid="3078"/>
+                                        </p:tgtEl>
+                                        <p:attrNameLst>
+                                          <p:attrName>style.visibility</p:attrName>
+                                        </p:attrNameLst>
+                                      </p:cBhvr>
+                                      <p:to>
+                                        <p:strVal val="visible"/>
+                                      </p:to>
+                                    </p:set>
+                                    <p:animEffect transition="in" filter="fade">
+                                      <p:cBhvr>
+                                        <p:cTn id="11" dur="500"/>
+                                        <p:tgtEl>
+                                          <p:spTgt spid="3078"/>
+                                        </p:tgtEl>
+                                      </p:cBhvr>
+                                    </p:animEffect>
+                                  </p:childTnLst>
+                                </p:cTn>
+                              </p:par>
+                            </p:childTnLst>
+                          </p:cTn>
+                        </p:par>
+                      </p:childTnLst>
+                    </p:cTn>
+                  </p:par>
+                  <p:par>
+                    <p:cTn id="12" fill="hold">
+                      <p:stCondLst>
+                        <p:cond delay="indefinite"/>
+                      </p:stCondLst>
+                      <p:childTnLst>
+                        <p:par>
+                          <p:cTn id="13" fill="hold">
+                            <p:stCondLst>
+                              <p:cond delay="0"/>
+                            </p:stCondLst>
+                            <p:childTnLst>
+                              <p:par>
+                                <p:cTn id="14" presetID="1" presetClass="entr" presetSubtype="0" fill="hold" grpId="0" nodeType="clickEffect">
+                                  <p:stCondLst>
+                                    <p:cond delay="0"/>
+                                  </p:stCondLst>
+                                  <p:childTnLst>
+                                    <p:set>
+                                      <p:cBhvr>
+                                        <p:cTn id="15" dur="1" fill="hold">
+                                          <p:stCondLst>
+                                            <p:cond delay="0"/>
+                                          </p:stCondLst>
+                                        </p:cTn>
+                                        <p:tgtEl>
+                                          <p:spTgt spid="5"/>
+                                        </p:tgtEl>
+                                        <p:attrNameLst>
+                                          <p:attrName>style.visibility</p:attrName>
+                                        </p:attrNameLst>
+                                      </p:cBhvr>
+                                      <p:to>
+                                        <p:strVal val="visible"/>
+                                      </p:to>
+                                    </p:set>
+                                  </p:childTnLst>
+                                </p:cTn>
+                              </p:par>
+                              <p:par>
+                                <p:cTn id="16" presetID="1" presetClass="entr" presetSubtype="0" fill="hold" nodeType="withEffect">
+                                  <p:stCondLst>
+                                    <p:cond delay="0"/>
+                                  </p:stCondLst>
+                                  <p:childTnLst>
+                                    <p:set>
+                                      <p:cBhvr>
+                                        <p:cTn id="17" dur="1" fill="hold">
+                                          <p:stCondLst>
+                                            <p:cond delay="0"/>
+                                          </p:stCondLst>
+                                        </p:cTn>
+                                        <p:tgtEl>
+                                          <p:spTgt spid="7"/>
+                                        </p:tgtEl>
+                                        <p:attrNameLst>
+                                          <p:attrName>style.visibility</p:attrName>
+                                        </p:attrNameLst>
+                                      </p:cBhvr>
+                                      <p:to>
+                                        <p:strVal val="visible"/>
+                                      </p:to>
+                                    </p:set>
+                                  </p:childTnLst>
+                                </p:cTn>
+                              </p:par>
+                            </p:childTnLst>
+                          </p:cTn>
+                        </p:par>
+                      </p:childTnLst>
+                    </p:cTn>
+                  </p:par>
+                  <p:par>
+                    <p:cTn id="18" fill="hold">
+                      <p:stCondLst>
+                        <p:cond delay="indefinite"/>
+                      </p:stCondLst>
+                      <p:childTnLst>
+                        <p:par>
+                          <p:cTn id="19" fill="hold">
+                            <p:stCondLst>
+                              <p:cond delay="0"/>
+                            </p:stCondLst>
+                            <p:childTnLst>
+                              <p:par>
+                                <p:cTn id="20" presetID="1" presetClass="entr" presetSubtype="0" fill="hold" nodeType="clickEffect">
+                                  <p:stCondLst>
+                                    <p:cond delay="0"/>
+                                  </p:stCondLst>
+                                  <p:childTnLst>
+                                    <p:set>
+                                      <p:cBhvr>
+                                        <p:cTn id="21" dur="1" fill="hold">
+                                          <p:stCondLst>
+                                            <p:cond delay="0"/>
+                                          </p:stCondLst>
+                                        </p:cTn>
+                                        <p:tgtEl>
+                                          <p:spTgt spid="12"/>
+                                        </p:tgtEl>
+                                        <p:attrNameLst>
+                                          <p:attrName>style.visibility</p:attrName>
+                                        </p:attrNameLst>
+                                      </p:cBhvr>
+                                      <p:to>
+                                        <p:strVal val="visible"/>
+                                      </p:to>
+                                    </p:set>
+                                  </p:childTnLst>
+                                </p:cTn>
+                              </p:par>
+                            </p:childTnLst>
+                          </p:cTn>
+                        </p:par>
+                      </p:childTnLst>
+                    </p:cTn>
+                  </p:par>
+                  <p:par>
+                    <p:cTn id="22" fill="hold">
+                      <p:stCondLst>
+                        <p:cond delay="indefinite"/>
+                      </p:stCondLst>
+                      <p:childTnLst>
+                        <p:par>
+                          <p:cTn id="23" fill="hold">
+                            <p:stCondLst>
+                              <p:cond delay="0"/>
+                            </p:stCondLst>
+                            <p:childTnLst>
+                              <p:par>
+                                <p:cTn id="24" presetID="1" presetClass="entr" presetSubtype="0" fill="hold" nodeType="clickEffect">
+                                  <p:stCondLst>
+                                    <p:cond delay="0"/>
+                                  </p:stCondLst>
+                                  <p:childTnLst>
+                                    <p:set>
+                                      <p:cBhvr>
+                                        <p:cTn id="25" dur="1" fill="hold">
+                                          <p:stCondLst>
+                                            <p:cond delay="0"/>
+                                          </p:stCondLst>
+                                        </p:cTn>
+                                        <p:tgtEl>
+                                          <p:spTgt spid="3">
+                                            <p:txEl>
+                                              <p:pRg st="1" end="1"/>
+                                            </p:txEl>
+                                          </p:spTgt>
+                                        </p:tgtEl>
+                                        <p:attrNameLst>
+                                          <p:attrName>style.visibility</p:attrName>
+                                        </p:attrNameLst>
+                                      </p:cBhvr>
+                                      <p:to>
+                                        <p:strVal val="visible"/>
+                                      </p:to>
+                                    </p:set>
+                                  </p:childTnLst>
+                                </p:cTn>
+                              </p:par>
+                            </p:childTnLst>
+                          </p:cTn>
+                        </p:par>
+                      </p:childTnLst>
+                    </p:cTn>
+                  </p:par>
+                  <p:par>
+                    <p:cTn id="26" fill="hold">
+                      <p:stCondLst>
+                        <p:cond delay="indefinite"/>
+                      </p:stCondLst>
+                      <p:childTnLst>
+                        <p:par>
+                          <p:cTn id="27" fill="hold">
+                            <p:stCondLst>
+                              <p:cond delay="0"/>
+                            </p:stCondLst>
+                            <p:childTnLst>
+                              <p:par>
+                                <p:cTn id="28" presetID="1" presetClass="entr" presetSubtype="0" fill="hold" nodeType="clickEffect">
+                                  <p:stCondLst>
+                                    <p:cond delay="0"/>
+                                  </p:stCondLst>
+                                  <p:childTnLst>
+                                    <p:set>
+                                      <p:cBhvr>
+                                        <p:cTn id="29" dur="1" fill="hold">
+                                          <p:stCondLst>
+                                            <p:cond delay="0"/>
+                                          </p:stCondLst>
+                                        </p:cTn>
+                                        <p:tgtEl>
+                                          <p:spTgt spid="3">
+                                            <p:txEl>
+                                              <p:pRg st="2" end="2"/>
+                                            </p:txEl>
+                                          </p:spTgt>
+                                        </p:tgtEl>
+                                        <p:attrNameLst>
+                                          <p:attrName>style.visibility</p:attrName>
+                                        </p:attrNameLst>
+                                      </p:cBhvr>
+                                      <p:to>
+                                        <p:strVal val="visible"/>
+                                      </p:to>
+                                    </p:set>
+                                  </p:childTnLst>
+                                </p:cTn>
+                              </p:par>
+                              <p:par>
+                                <p:cTn id="30" presetID="1" presetClass="entr" presetSubtype="0" fill="hold" nodeType="withEffect">
+                                  <p:stCondLst>
+                                    <p:cond delay="0"/>
+                                  </p:stCondLst>
+                                  <p:childTnLst>
+                                    <p:set>
+                                      <p:cBhvr>
+                                        <p:cTn id="31" dur="1" fill="hold">
+                                          <p:stCondLst>
+                                            <p:cond delay="0"/>
+                                          </p:stCondLst>
+                                        </p:cTn>
+                                        <p:tgtEl>
+                                          <p:spTgt spid="3">
+                                            <p:txEl>
+                                              <p:pRg st="3" end="3"/>
+                                            </p:txEl>
+                                          </p:spTgt>
+                                        </p:tgtEl>
+                                        <p:attrNameLst>
+                                          <p:attrName>style.visibility</p:attrName>
+                                        </p:attrNameLst>
+                                      </p:cBhvr>
+                                      <p:to>
+                                        <p:strVal val="visible"/>
+                                      </p:to>
+                                    </p:set>
+                                  </p:childTnLst>
+                                </p:cTn>
+                              </p:par>
+                              <p:par>
+                                <p:cTn id="32" presetID="1" presetClass="entr" presetSubtype="0" fill="hold" nodeType="withEffect">
+                                  <p:stCondLst>
+                                    <p:cond delay="0"/>
+                                  </p:stCondLst>
+                                  <p:childTnLst>
+                                    <p:set>
+                                      <p:cBhvr>
+                                        <p:cTn id="33" dur="1" fill="hold">
+                                          <p:stCondLst>
+                                            <p:cond delay="0"/>
+                                          </p:stCondLst>
+                                        </p:cTn>
+                                        <p:tgtEl>
+                                          <p:spTgt spid="3">
+                                            <p:txEl>
+                                              <p:pRg st="4" end="4"/>
+                                            </p:txEl>
+                                          </p:spTgt>
+                                        </p:tgtEl>
+                                        <p:attrNameLst>
+                                          <p:attrName>style.visibility</p:attrName>
+                                        </p:attrNameLst>
+                                      </p:cBhvr>
+                                      <p:to>
+                                        <p:strVal val="visible"/>
+                                      </p:to>
+                                    </p:set>
+                                  </p:childTnLst>
+                                </p:cTn>
+                              </p:par>
+                            </p:childTnLst>
+                          </p:cTn>
+                        </p:par>
+                      </p:childTnLst>
+                    </p:cTn>
+                  </p:par>
+                </p:childTnLst>
+              </p:cTn>
+              <p:prevCondLst>
+                <p:cond evt="onPrev" delay="0">
+                  <p:tgtEl>
+                    <p:sldTgt/>
+                  </p:tgtEl>
+                </p:cond>
+              </p:prevCondLst>
+              <p:nextCondLst>
+                <p:cond evt="onNext" delay="0">
+                  <p:tgtEl>
+                    <p:sldTgt/>
+                  </p:tgtEl>
+                </p:cond>
+              </p:nextCondLst>
+            </p:seq>
+          </p:childTnLst>
+        </p:cTn>
+      </p:par>
+    </p:tnLst>
+    <p:bldLst>
+      <p:bldP spid="5" grpId="0"/>
+    </p:bldLst>
+  </p:timing>
+</p:sld>
+</file>
+
+<file path=ppt/slides/slide21.xml><?xml version="1.0" encoding="utf-8"?>
+<p:sld xmlns:a="http://schemas.openxmlformats.org/drawingml/2006/main" xmlns:r="http://schemas.openxmlformats.org/officeDocument/2006/relationships" xmlns:p="http://schemas.openxmlformats.org/presentationml/2006/main">
+  <p:cSld>
+    <p:spTree>
+      <p:nvGrpSpPr>
+        <p:cNvPr id="1" name=""/>
+        <p:cNvGrpSpPr/>
+        <p:nvPr/>
+      </p:nvGrpSpPr>
+      <p:grpSpPr>
+        <a:xfrm>
+          <a:off x="0" y="0"/>
+          <a:ext cx="0" cy="0"/>
+          <a:chOff x="0" y="0"/>
+          <a:chExt cx="0" cy="0"/>
+        </a:xfrm>
+      </p:grpSpPr>
+      <p:sp>
+        <p:nvSpPr>
+          <p:cNvPr id="2" name="Title 1">
+            <a:extLst>
+              <a:ext uri="{FF2B5EF4-FFF2-40B4-BE49-F238E27FC236}">
+                <a16:creationId xmlns:a16="http://schemas.microsoft.com/office/drawing/2014/main" id="{E233454E-CABA-407C-900C-79D0A192F629}"/>
+              </a:ext>
+            </a:extLst>
+          </p:cNvPr>
+          <p:cNvSpPr>
+            <a:spLocks noGrp="1"/>
+          </p:cNvSpPr>
+          <p:nvPr>
+            <p:ph type="title"/>
+          </p:nvPr>
+        </p:nvSpPr>
+        <p:spPr/>
+        <p:txBody>
+          <a:bodyPr/>
+          <a:lstStyle/>
+          <a:p>
+            <a:r>
+              <a:rPr lang="en-US" dirty="0"/>
+              <a:t>Types of Machine Learning</a:t>
+            </a:r>
+          </a:p>
+        </p:txBody>
+      </p:sp>
+      <p:sp>
+        <p:nvSpPr>
+          <p:cNvPr id="4" name="Slide Number Placeholder 3">
+            <a:extLst>
+              <a:ext uri="{FF2B5EF4-FFF2-40B4-BE49-F238E27FC236}">
+                <a16:creationId xmlns:a16="http://schemas.microsoft.com/office/drawing/2014/main" id="{06FD43A9-5C9D-42D3-BFDA-A2FD20418261}"/>
+              </a:ext>
+            </a:extLst>
+          </p:cNvPr>
+          <p:cNvSpPr>
+            <a:spLocks noGrp="1"/>
+          </p:cNvSpPr>
+          <p:nvPr>
+            <p:ph type="sldNum" sz="quarter" idx="12"/>
+          </p:nvPr>
+        </p:nvSpPr>
+        <p:spPr/>
+        <p:txBody>
+          <a:bodyPr/>
+          <a:lstStyle/>
+          <a:p>
+            <a:fld id="{629637A9-119A-49DA-BD12-AAC58B377D80}" type="slidenum">
+              <a:rPr lang="en-US" smtClean="0"/>
+              <a:t>21</a:t>
+            </a:fld>
+            <a:endParaRPr lang="en-US" dirty="0"/>
+          </a:p>
+        </p:txBody>
+      </p:sp>
+      <p:pic>
+        <p:nvPicPr>
+          <p:cNvPr id="2052" name="Picture 4" descr="Types of Machine Learning Algorithms | 7wData">
+            <a:extLst>
+              <a:ext uri="{FF2B5EF4-FFF2-40B4-BE49-F238E27FC236}">
+                <a16:creationId xmlns:a16="http://schemas.microsoft.com/office/drawing/2014/main" id="{8A2BAA57-CD2B-402D-BDCC-847DFD38F6C5}"/>
+              </a:ext>
+            </a:extLst>
+          </p:cNvPr>
+          <p:cNvPicPr>
+            <a:picLocks noChangeAspect="1" noChangeArrowheads="1"/>
+          </p:cNvPicPr>
+          <p:nvPr/>
+        </p:nvPicPr>
+        <p:blipFill>
+          <a:blip r:embed="rId2">
+            <a:extLst>
+              <a:ext uri="{28A0092B-C50C-407E-A947-70E740481C1C}">
+                <a14:useLocalDpi xmlns:a14="http://schemas.microsoft.com/office/drawing/2010/main" val="0"/>
+              </a:ext>
+            </a:extLst>
+          </a:blip>
+          <a:srcRect/>
+          <a:stretch>
+            <a:fillRect/>
+          </a:stretch>
+        </p:blipFill>
+        <p:spPr bwMode="auto">
+          <a:xfrm>
+            <a:off x="1367276" y="1626467"/>
+            <a:ext cx="5696340" cy="4072855"/>
+          </a:xfrm>
+          <a:prstGeom prst="rect">
+            <a:avLst/>
+          </a:prstGeom>
+          <a:noFill/>
+          <a:extLst>
+            <a:ext uri="{909E8E84-426E-40DD-AFC4-6F175D3DCCD1}">
+              <a14:hiddenFill xmlns:a14="http://schemas.microsoft.com/office/drawing/2010/main">
+                <a:solidFill>
+                  <a:srgbClr val="FFFFFF"/>
+                </a:solidFill>
+              </a14:hiddenFill>
+            </a:ext>
+          </a:extLst>
+        </p:spPr>
+      </p:pic>
+      <p:sp>
+        <p:nvSpPr>
+          <p:cNvPr id="8" name="TextBox 7">
+            <a:extLst>
+              <a:ext uri="{FF2B5EF4-FFF2-40B4-BE49-F238E27FC236}">
+                <a16:creationId xmlns:a16="http://schemas.microsoft.com/office/drawing/2014/main" id="{1126C330-1896-4A27-BF1F-C79ADD9D4127}"/>
+              </a:ext>
+            </a:extLst>
+          </p:cNvPr>
+          <p:cNvSpPr txBox="1"/>
+          <p:nvPr/>
+        </p:nvSpPr>
+        <p:spPr>
+          <a:xfrm>
+            <a:off x="8124631" y="4295488"/>
+            <a:ext cx="3603949" cy="923330"/>
+          </a:xfrm>
+          <a:prstGeom prst="rect">
+            <a:avLst/>
+          </a:prstGeom>
+          <a:noFill/>
+        </p:spPr>
+        <p:txBody>
+          <a:bodyPr wrap="square">
+            <a:spAutoFit/>
+          </a:bodyPr>
+          <a:lstStyle/>
+          <a:p>
+            <a:r>
+              <a:rPr lang="en-US" dirty="0">
+                <a:hlinkClick r:id="rId3"/>
+              </a:rPr>
+              <a:t>https://www.7wdata.be/visualization/types-of-machine-learning-algorithms-2/</a:t>
+            </a:r>
+            <a:endParaRPr lang="en-US" dirty="0"/>
+          </a:p>
+        </p:txBody>
+      </p:sp>
+    </p:spTree>
+    <p:extLst>
+      <p:ext uri="{BB962C8B-B14F-4D97-AF65-F5344CB8AC3E}">
+        <p14:creationId xmlns:p14="http://schemas.microsoft.com/office/powerpoint/2010/main" val="1203600160"/>
+      </p:ext>
+    </p:extLst>
+  </p:cSld>
+  <p:clrMapOvr>
+    <a:masterClrMapping/>
+  </p:clrMapOvr>
+</p:sld>
+</file>
+
+<file path=ppt/slides/slide22.xml><?xml version="1.0" encoding="utf-8"?>
+<p:sld xmlns:a="http://schemas.openxmlformats.org/drawingml/2006/main" xmlns:r="http://schemas.openxmlformats.org/officeDocument/2006/relationships" xmlns:p="http://schemas.openxmlformats.org/presentationml/2006/main">
+  <p:cSld>
+    <p:spTree>
+      <p:nvGrpSpPr>
+        <p:cNvPr id="1" name=""/>
+        <p:cNvGrpSpPr/>
+        <p:nvPr/>
+      </p:nvGrpSpPr>
+      <p:grpSpPr>
+        <a:xfrm>
+          <a:off x="0" y="0"/>
+          <a:ext cx="0" cy="0"/>
+          <a:chOff x="0" y="0"/>
+          <a:chExt cx="0" cy="0"/>
+        </a:xfrm>
+      </p:grpSpPr>
+      <p:sp>
+        <p:nvSpPr>
+          <p:cNvPr id="2" name="Title 1">
+            <a:extLst>
+              <a:ext uri="{FF2B5EF4-FFF2-40B4-BE49-F238E27FC236}">
+                <a16:creationId xmlns:a16="http://schemas.microsoft.com/office/drawing/2014/main" id="{11C7A136-FB7A-4CD6-AF07-750666A9AEB9}"/>
+              </a:ext>
+            </a:extLst>
+          </p:cNvPr>
+          <p:cNvSpPr>
+            <a:spLocks noGrp="1"/>
+          </p:cNvSpPr>
+          <p:nvPr>
+            <p:ph type="title"/>
+          </p:nvPr>
+        </p:nvSpPr>
+        <p:spPr/>
+        <p:txBody>
+          <a:bodyPr/>
+          <a:lstStyle/>
+          <a:p>
+            <a:r>
+              <a:rPr lang="en-US" dirty="0"/>
+              <a:t>In-Class Exercise 2</a:t>
+            </a:r>
+          </a:p>
+        </p:txBody>
+      </p:sp>
+      <p:sp>
+        <p:nvSpPr>
+          <p:cNvPr id="4" name="Slide Number Placeholder 3">
+            <a:extLst>
+              <a:ext uri="{FF2B5EF4-FFF2-40B4-BE49-F238E27FC236}">
+                <a16:creationId xmlns:a16="http://schemas.microsoft.com/office/drawing/2014/main" id="{47020B85-24B1-4B15-B7D7-1B7747DF907F}"/>
+              </a:ext>
+            </a:extLst>
+          </p:cNvPr>
+          <p:cNvSpPr>
+            <a:spLocks noGrp="1"/>
+          </p:cNvSpPr>
+          <p:nvPr>
+            <p:ph type="sldNum" sz="quarter" idx="12"/>
+          </p:nvPr>
+        </p:nvSpPr>
+        <p:spPr/>
+        <p:txBody>
+          <a:bodyPr/>
+          <a:lstStyle/>
+          <a:p>
+            <a:fld id="{629637A9-119A-49DA-BD12-AAC58B377D80}" type="slidenum">
+              <a:rPr lang="en-US" smtClean="0"/>
+              <a:t>22</a:t>
+            </a:fld>
+            <a:endParaRPr lang="en-US" dirty="0"/>
+          </a:p>
+        </p:txBody>
+      </p:sp>
+      <p:pic>
+        <p:nvPicPr>
+          <p:cNvPr id="5" name="Picture 4">
+            <a:extLst>
+              <a:ext uri="{FF2B5EF4-FFF2-40B4-BE49-F238E27FC236}">
+                <a16:creationId xmlns:a16="http://schemas.microsoft.com/office/drawing/2014/main" id="{8D59BE00-319F-4FAC-BF9F-432F1F473B69}"/>
+              </a:ext>
+            </a:extLst>
+          </p:cNvPr>
+          <p:cNvPicPr>
+            <a:picLocks noChangeAspect="1"/>
+          </p:cNvPicPr>
+          <p:nvPr/>
+        </p:nvPicPr>
+        <p:blipFill>
+          <a:blip r:embed="rId2"/>
+          <a:stretch>
+            <a:fillRect/>
+          </a:stretch>
+        </p:blipFill>
+        <p:spPr>
+          <a:xfrm>
+            <a:off x="1097279" y="1645819"/>
+            <a:ext cx="7855261" cy="4839201"/>
+          </a:xfrm>
+          <a:prstGeom prst="rect">
+            <a:avLst/>
+          </a:prstGeom>
+        </p:spPr>
+      </p:pic>
+    </p:spTree>
+    <p:extLst>
+      <p:ext uri="{BB962C8B-B14F-4D97-AF65-F5344CB8AC3E}">
+        <p14:creationId xmlns:p14="http://schemas.microsoft.com/office/powerpoint/2010/main" val="1534500896"/>
+      </p:ext>
+    </p:extLst>
+  </p:cSld>
+  <p:clrMapOvr>
+    <a:masterClrMapping/>
+  </p:clrMapOvr>
+</p:sld>
+</file>
+
+<file path=ppt/slides/slide23.xml><?xml version="1.0" encoding="utf-8"?>
+<p:sld xmlns:a="http://schemas.openxmlformats.org/drawingml/2006/main" xmlns:r="http://schemas.openxmlformats.org/officeDocument/2006/relationships" xmlns:p="http://schemas.openxmlformats.org/presentationml/2006/main">
+  <p:cSld>
+    <p:spTree>
+      <p:nvGrpSpPr>
+        <p:cNvPr id="1" name=""/>
+        <p:cNvGrpSpPr/>
+        <p:nvPr/>
+      </p:nvGrpSpPr>
+      <p:grpSpPr>
+        <a:xfrm>
+          <a:off x="0" y="0"/>
+          <a:ext cx="0" cy="0"/>
+          <a:chOff x="0" y="0"/>
+          <a:chExt cx="0" cy="0"/>
+        </a:xfrm>
+      </p:grpSpPr>
+      <p:sp>
+        <p:nvSpPr>
           <p:cNvPr id="2" name="Title 1"/>
           <p:cNvSpPr>
             <a:spLocks noGrp="1"/>
@@ -8302,7 +11496,7 @@
           <a:p>
             <a:fld id="{629637A9-119A-49DA-BD12-AAC58B377D80}" type="slidenum">
               <a:rPr lang="en-US" smtClean="0"/>
-              <a:t>20</a:t>
+              <a:t>23</a:t>
             </a:fld>
             <a:endParaRPr lang="en-US" dirty="0"/>
           </a:p>
@@ -8367,7 +11561,7 @@
 </p:sld>
 </file>
 
-<file path=ppt/slides/slide21.xml><?xml version="1.0" encoding="utf-8"?>
+<file path=ppt/slides/slide24.xml><?xml version="1.0" encoding="utf-8"?>
 <p:sld xmlns:a="http://schemas.openxmlformats.org/drawingml/2006/main" xmlns:r="http://schemas.openxmlformats.org/officeDocument/2006/relationships" xmlns:p="http://schemas.openxmlformats.org/presentationml/2006/main">
   <p:cSld>
     <p:spTree>
@@ -8493,7 +11687,7 @@
           <a:p>
             <a:fld id="{629637A9-119A-49DA-BD12-AAC58B377D80}" type="slidenum">
               <a:rPr lang="en-US" smtClean="0"/>
-              <a:t>21</a:t>
+              <a:t>24</a:t>
             </a:fld>
             <a:endParaRPr lang="en-US" dirty="0"/>
           </a:p>
@@ -8632,7 +11826,7 @@
 </p:sld>
 </file>
 
-<file path=ppt/slides/slide22.xml><?xml version="1.0" encoding="utf-8"?>
+<file path=ppt/slides/slide25.xml><?xml version="1.0" encoding="utf-8"?>
 <p:sld xmlns:a="http://schemas.openxmlformats.org/drawingml/2006/main" xmlns:r="http://schemas.openxmlformats.org/officeDocument/2006/relationships" xmlns:p="http://schemas.openxmlformats.org/presentationml/2006/main">
   <p:cSld>
     <p:spTree>
@@ -8809,7 +12003,7 @@
           <a:p>
             <a:fld id="{629637A9-119A-49DA-BD12-AAC58B377D80}" type="slidenum">
               <a:rPr lang="en-US" smtClean="0"/>
-              <a:t>22</a:t>
+              <a:t>25</a:t>
             </a:fld>
             <a:endParaRPr lang="en-US" dirty="0"/>
           </a:p>
@@ -9255,7 +12449,7 @@
 </p:sld>
 </file>
 
-<file path=ppt/slides/slide23.xml><?xml version="1.0" encoding="utf-8"?>
+<file path=ppt/slides/slide26.xml><?xml version="1.0" encoding="utf-8"?>
 <p:sld xmlns:a="http://schemas.openxmlformats.org/drawingml/2006/main" xmlns:r="http://schemas.openxmlformats.org/officeDocument/2006/relationships" xmlns:p="http://schemas.openxmlformats.org/presentationml/2006/main">
   <p:cSld>
     <p:spTree>
@@ -9383,7 +12577,7 @@
           <a:p>
             <a:fld id="{629637A9-119A-49DA-BD12-AAC58B377D80}" type="slidenum">
               <a:rPr lang="en-US" smtClean="0"/>
-              <a:t>23</a:t>
+              <a:t>26</a:t>
             </a:fld>
             <a:endParaRPr lang="en-US" dirty="0"/>
           </a:p>
@@ -12814,8 +16008,8 @@
             </a:prstGeom>
           </p:spPr>
         </p:pic>
-        <mc:AlternateContent xmlns:mc="http://schemas.openxmlformats.org/markup-compatibility/2006">
-          <mc:Choice xmlns:a14="http://schemas.microsoft.com/office/drawing/2010/main" Requires="a14">
+        <mc:AlternateContent xmlns:mc="http://schemas.openxmlformats.org/markup-compatibility/2006" xmlns:a14="http://schemas.microsoft.com/office/drawing/2010/main">
+          <mc:Choice Requires="a14">
             <p:sp>
               <p:nvSpPr>
                 <p:cNvPr id="6" name="TextBox 5"/>
@@ -12879,7 +16073,7 @@
               </p:txBody>
             </p:sp>
           </mc:Choice>
-          <mc:Fallback>
+          <mc:Fallback xmlns="">
             <p:sp>
               <p:nvSpPr>
                 <p:cNvPr id="6" name="TextBox 5"/>
@@ -12918,8 +16112,8 @@
             </p:sp>
           </mc:Fallback>
         </mc:AlternateContent>
-        <mc:AlternateContent xmlns:mc="http://schemas.openxmlformats.org/markup-compatibility/2006">
-          <mc:Choice xmlns:a14="http://schemas.microsoft.com/office/drawing/2010/main" Requires="a14">
+        <mc:AlternateContent xmlns:mc="http://schemas.openxmlformats.org/markup-compatibility/2006" xmlns:a14="http://schemas.microsoft.com/office/drawing/2010/main">
+          <mc:Choice Requires="a14">
             <p:sp>
               <p:nvSpPr>
                 <p:cNvPr id="8" name="TextBox 7">
@@ -12995,7 +16189,7 @@
               </p:txBody>
             </p:sp>
           </mc:Choice>
-          <mc:Fallback>
+          <mc:Fallback xmlns="">
             <p:sp>
               <p:nvSpPr>
                 <p:cNvPr id="8" name="TextBox 7">

</xml_diff>

<commit_message>
Updated intro video for Unit 3.
</commit_message>
<xml_diff>
--- a/lectures/Lect01_IntroML.pptx
+++ b/lectures/Lect01_IntroML.pptx
@@ -6498,8 +6498,8 @@
           </a:p>
         </p:txBody>
       </p:sp>
-      <mc:AlternateContent xmlns:mc="http://schemas.openxmlformats.org/markup-compatibility/2006">
-        <mc:Choice xmlns:a14="http://schemas.microsoft.com/office/drawing/2010/main" Requires="a14">
+      <mc:AlternateContent xmlns:mc="http://schemas.openxmlformats.org/markup-compatibility/2006" xmlns:a14="http://schemas.microsoft.com/office/drawing/2010/main">
+        <mc:Choice Requires="a14">
           <p:sp>
             <p:nvSpPr>
               <p:cNvPr id="3" name="Content Placeholder 2"/>
@@ -6816,7 +6816,7 @@
             </p:txBody>
           </p:sp>
         </mc:Choice>
-        <mc:Fallback>
+        <mc:Fallback xmlns="">
           <p:sp>
             <p:nvSpPr>
               <p:cNvPr id="3" name="Content Placeholder 2"/>
@@ -7010,8 +7010,8 @@
             </a:p>
           </p:txBody>
         </p:sp>
-        <mc:AlternateContent xmlns:mc="http://schemas.openxmlformats.org/markup-compatibility/2006">
-          <mc:Choice xmlns:a14="http://schemas.microsoft.com/office/drawing/2010/main" Requires="a14">
+        <mc:AlternateContent xmlns:mc="http://schemas.openxmlformats.org/markup-compatibility/2006" xmlns:a14="http://schemas.microsoft.com/office/drawing/2010/main">
+          <mc:Choice Requires="a14">
             <p:sp>
               <p:nvSpPr>
                 <p:cNvPr id="9" name="TextBox 8">
@@ -7042,6 +7042,7 @@
                 </a:bodyPr>
                 <a:lstStyle/>
                 <a:p>
+                  <a:pPr/>
                   <a14:m>
                     <m:oMathPara xmlns:m="http://schemas.openxmlformats.org/officeDocument/2006/math">
                       <m:oMathParaPr>
@@ -7081,7 +7082,7 @@
               </p:txBody>
             </p:sp>
           </mc:Choice>
-          <mc:Fallback>
+          <mc:Fallback xmlns="">
             <p:sp>
               <p:nvSpPr>
                 <p:cNvPr id="9" name="TextBox 8">
@@ -7126,8 +7127,8 @@
             </p:sp>
           </mc:Fallback>
         </mc:AlternateContent>
-        <mc:AlternateContent xmlns:mc="http://schemas.openxmlformats.org/markup-compatibility/2006">
-          <mc:Choice xmlns:a14="http://schemas.microsoft.com/office/drawing/2010/main" Requires="a14">
+        <mc:AlternateContent xmlns:mc="http://schemas.openxmlformats.org/markup-compatibility/2006" xmlns:a14="http://schemas.microsoft.com/office/drawing/2010/main">
+          <mc:Choice Requires="a14">
             <p:sp>
               <p:nvSpPr>
                 <p:cNvPr id="11" name="TextBox 10">
@@ -7198,7 +7199,7 @@
               </p:txBody>
             </p:sp>
           </mc:Choice>
-          <mc:Fallback>
+          <mc:Fallback xmlns="">
             <p:sp>
               <p:nvSpPr>
                 <p:cNvPr id="11" name="TextBox 10">
@@ -7273,7 +7274,6 @@
             </a:bodyPr>
             <a:lstStyle/>
             <a:p>
-              <a:pPr/>
               <a:r>
                 <a:rPr lang="en-US" dirty="0"/>
                 <a:t>High risk</a:t>
@@ -7918,8 +7918,8 @@
           </a:p>
         </p:txBody>
       </p:sp>
-      <mc:AlternateContent xmlns:mc="http://schemas.openxmlformats.org/markup-compatibility/2006">
-        <mc:Choice xmlns:a14="http://schemas.microsoft.com/office/drawing/2010/main" Requires="a14">
+      <mc:AlternateContent xmlns:mc="http://schemas.openxmlformats.org/markup-compatibility/2006" xmlns:a14="http://schemas.microsoft.com/office/drawing/2010/main">
+        <mc:Choice Requires="a14">
           <p:sp>
             <p:nvSpPr>
               <p:cNvPr id="3" name="Content Placeholder 2"/>
@@ -8220,7 +8220,7 @@
             </p:txBody>
           </p:sp>
         </mc:Choice>
-        <mc:Fallback>
+        <mc:Fallback xmlns="">
           <p:sp>
             <p:nvSpPr>
               <p:cNvPr id="3" name="Content Placeholder 2"/>
@@ -9037,8 +9037,8 @@
           </a:p>
         </p:txBody>
       </p:sp>
-      <mc:AlternateContent xmlns:mc="http://schemas.openxmlformats.org/markup-compatibility/2006">
-        <mc:Choice xmlns:a14="http://schemas.microsoft.com/office/drawing/2010/main" Requires="a14">
+      <mc:AlternateContent xmlns:mc="http://schemas.openxmlformats.org/markup-compatibility/2006" xmlns:a14="http://schemas.microsoft.com/office/drawing/2010/main">
+        <mc:Choice Requires="a14">
           <p:sp>
             <p:nvSpPr>
               <p:cNvPr id="3" name="Content Placeholder 2"/>
@@ -9136,7 +9136,7 @@
             </p:txBody>
           </p:sp>
         </mc:Choice>
-        <mc:Fallback>
+        <mc:Fallback xmlns="">
           <p:sp>
             <p:nvSpPr>
               <p:cNvPr id="3" name="Content Placeholder 2"/>

</xml_diff>